<commit_message>
Deployed 434e88b with MkDocs version: 1.1.2
</commit_message>
<xml_diff>
--- a/aulas/02-desempenho/slides.pptx
+++ b/aulas/02-desempenho/slides.pptx
@@ -17,6 +17,11 @@
     <p:sldId id="264" r:id="rId13"/>
     <p:sldId id="265" r:id="rId14"/>
     <p:sldId id="266" r:id="rId15"/>
+    <p:sldId id="267" r:id="rId16"/>
+    <p:sldId id="268" r:id="rId17"/>
+    <p:sldId id="269" r:id="rId18"/>
+    <p:sldId id="270" r:id="rId19"/>
+    <p:sldId id="271" r:id="rId20"/>
   </p:sldIdLst>
   <p:sldSz cx="9144000" cy="6858000" type="screen4x3"/>
   <p:notesSz cx="6858000" cy="9144000"/>
@@ -13067,14 +13072,14 @@
       </p:grpSpPr>
       <p:sp>
         <p:nvSpPr>
-          <p:cNvPr id="4" name="Google Shape;323;p61" hidden="0"/>
+          <p:cNvPr id="4" name="Google Shape;347;p64" hidden="0"/>
           <p:cNvSpPr/>
           <p:nvPr isPhoto="0" userDrawn="0"/>
         </p:nvSpPr>
         <p:spPr bwMode="auto">
           <a:xfrm>
-            <a:off x="457200" y="781200"/>
-            <a:ext cx="8228399" cy="617999"/>
+            <a:off x="457200" y="2920660"/>
+            <a:ext cx="8228520" cy="618120"/>
           </a:xfrm>
           <a:prstGeom prst="rect">
             <a:avLst/>
@@ -13090,7 +13095,7 @@
           </a:bodyPr>
           <a:lstStyle/>
           <a:p>
-            <a:pPr marL="0" marR="0" lvl="0" indent="0" algn="l">
+            <a:pPr marL="0" marR="0" lvl="0" indent="0" algn="ctr">
               <a:lnSpc>
                 <a:spcPct val="100000"/>
               </a:lnSpc>
@@ -13104,7 +13109,7 @@
               <a:defRPr/>
             </a:pPr>
             <a:r>
-              <a:rPr lang="pt-BR" sz="3200" b="0" i="0" u="none" strike="noStrike" cap="none">
+              <a:rPr lang="pt-BR" sz="3600" b="1" i="0" u="none" strike="noStrike" cap="none">
                 <a:solidFill>
                   <a:srgbClr val="C00026"/>
                 </a:solidFill>
@@ -13112,9 +13117,9 @@
                 <a:ea typeface="Verdana"/>
                 <a:cs typeface="Verdana"/>
               </a:rPr>
-              <a:t>Gabaritos e respostas</a:t>
+              <a:t>Atividade prática</a:t>
             </a:r>
-            <a:endParaRPr sz="3200" b="0" i="0" u="none" strike="noStrike" cap="none">
+            <a:endParaRPr sz="3600" b="1" i="0" u="none" strike="noStrike" cap="none">
               <a:solidFill>
                 <a:schemeClr val="dk1"/>
               </a:solidFill>
@@ -13127,14 +13132,14 @@
       </p:sp>
       <p:sp>
         <p:nvSpPr>
-          <p:cNvPr id="5" name="Google Shape;324;p61" hidden="0"/>
+          <p:cNvPr id="5" name="Google Shape;348;p64" hidden="0"/>
           <p:cNvSpPr/>
           <p:nvPr isPhoto="0" userDrawn="0"/>
         </p:nvSpPr>
         <p:spPr bwMode="auto">
           <a:xfrm>
             <a:off x="162000" y="85680"/>
-            <a:ext cx="7228499" cy="351299"/>
+            <a:ext cx="7228440" cy="351360"/>
           </a:xfrm>
           <a:prstGeom prst="rect">
             <a:avLst/>
@@ -13145,7 +13150,7 @@
           </a:ln>
         </p:spPr>
         <p:txBody>
-          <a:bodyPr spcFirstLastPara="1" wrap="square" lIns="91423" tIns="91423" rIns="91423" bIns="91423" anchor="ctr" anchorCtr="0">
+          <a:bodyPr spcFirstLastPara="1" wrap="square" lIns="91422" tIns="91422" rIns="91422" bIns="91422" anchor="ctr" anchorCtr="0">
             <a:noAutofit/>
           </a:bodyPr>
           <a:lstStyle/>
@@ -13166,14 +13171,14 @@
       </p:sp>
       <p:sp>
         <p:nvSpPr>
-          <p:cNvPr id="6" name="Google Shape;325;p61" hidden="0"/>
+          <p:cNvPr id="6" name="Google Shape;349;p64" hidden="0"/>
           <p:cNvSpPr/>
           <p:nvPr isPhoto="0" userDrawn="0"/>
         </p:nvSpPr>
         <p:spPr bwMode="auto">
           <a:xfrm>
             <a:off x="84240" y="6402240"/>
-            <a:ext cx="640499" cy="363898"/>
+            <a:ext cx="640440" cy="363960"/>
           </a:xfrm>
           <a:prstGeom prst="rect">
             <a:avLst/>
@@ -13202,7 +13207,7 @@
               <a:buNone/>
               <a:defRPr/>
             </a:pPr>
-            <a:fld id="{385A57BA-CBEC-5149-48FD-A4C75DE304E2}" type="slidenum">
+            <a:fld id="{6BD212D0-B152-A436-4E68-37FA9749967B}" type="slidenum">
               <a:rPr lang="pt-BR" sz="1000" b="0" i="0" u="none" strike="noStrike" cap="none">
                 <a:solidFill>
                   <a:srgbClr val="B2B2B2"/>
@@ -13226,328 +13231,61 @@
       </p:sp>
       <p:sp>
         <p:nvSpPr>
-          <p:cNvPr id="7" name="Google Shape;326;p61" hidden="0"/>
-          <p:cNvSpPr>
-            <a:spLocks noAdjustHandles="0" noChangeArrowheads="0"/>
-          </p:cNvSpPr>
+          <p:cNvPr id="7" name="" hidden="0"/>
+          <p:cNvSpPr/>
           <p:nvPr isPhoto="0" userDrawn="0"/>
         </p:nvSpPr>
         <p:spPr bwMode="auto">
-          <a:xfrm>
-            <a:off x="576000" y="1728000"/>
-            <a:ext cx="8228399" cy="4443300"/>
+          <a:xfrm flipH="0" flipV="0">
+            <a:off x="724678" y="4088421"/>
+            <a:ext cx="8137934" cy="363450"/>
           </a:xfrm>
           <a:prstGeom prst="rect">
             <a:avLst/>
           </a:prstGeom>
           <a:noFill/>
-          <a:ln>
-            <a:noFill/>
-          </a:ln>
         </p:spPr>
         <p:txBody>
-          <a:bodyPr spcFirstLastPara="1" wrap="square" lIns="90000" tIns="45000" rIns="90000" bIns="45000" anchor="t" anchorCtr="0">
+          <a:bodyPr vertOverflow="overflow" horzOverflow="clip" vert="horz" wrap="square" lIns="91440" tIns="45720" rIns="91440" bIns="45720" numCol="1" spcCol="0" rtlCol="0" fromWordArt="0" anchor="t" anchorCtr="0" forceAA="0" upright="0" compatLnSpc="0">
             <a:noAutofit/>
           </a:bodyPr>
-          <a:lstStyle/>
-          <a:p>
-            <a:pPr lvl="0" algn="l">
-              <a:lnSpc>
-                <a:spcPct val="150000"/>
-              </a:lnSpc>
-              <a:spcBef>
-                <a:spcPts val="0"/>
-              </a:spcBef>
-              <a:spcAft>
-                <a:spcPts val="0"/>
-              </a:spcAft>
+          <a:p>
+            <a:pPr>
               <a:defRPr/>
             </a:pPr>
             <a:r>
-              <a:rPr lang="pt-BR" sz="2300" b="0" i="0" u="none" strike="noStrike" cap="none" spc="0">
-                <a:solidFill>
-                  <a:schemeClr val="dk1"/>
-                </a:solidFill>
-                <a:latin typeface="Arial"/>
-                <a:ea typeface="Arial"/>
-                <a:cs typeface="Arial"/>
-              </a:rPr>
-              <a:t>Para cada aluno acompanhar seu progresso será oferecido:</a:t>
+              <a:rPr sz="2000" b="1"/>
+              <a:t>Começando SuperComputação</a:t>
             </a:r>
-            <a:endParaRPr sz="2300" b="0" i="0" u="none" strike="noStrike" cap="none" spc="0">
-              <a:solidFill>
-                <a:schemeClr val="dk1"/>
-              </a:solidFill>
-              <a:latin typeface="Arial"/>
-              <a:ea typeface="Arial"/>
-              <a:cs typeface="Arial"/>
-            </a:endParaRPr>
-          </a:p>
-          <a:p>
-            <a:pPr marL="349965" lvl="0" indent="-349965" algn="l">
-              <a:lnSpc>
-                <a:spcPct val="150000"/>
-              </a:lnSpc>
-              <a:spcBef>
-                <a:spcPts val="0"/>
-              </a:spcBef>
-              <a:spcAft>
-                <a:spcPts val="0"/>
-              </a:spcAft>
+            <a:endParaRPr sz="2000" b="1"/>
+          </a:p>
+          <a:p>
+            <a:pPr>
+              <a:defRPr/>
+            </a:pPr>
+            <a:endParaRPr sz="2000"/>
+          </a:p>
+          <a:p>
+            <a:pPr marL="305908" indent="-305908">
               <a:buAutoNum type="arabicPeriod"/>
               <a:defRPr/>
             </a:pPr>
-            <a:endParaRPr sz="2300" b="0" i="0" u="none" strike="noStrike" cap="none" spc="0">
-              <a:solidFill>
-                <a:schemeClr val="dk1"/>
-              </a:solidFill>
-              <a:latin typeface="Arial"/>
-              <a:ea typeface="Arial"/>
-              <a:cs typeface="Arial"/>
-            </a:endParaRPr>
-          </a:p>
-          <a:p>
-            <a:pPr marL="349965" lvl="0" indent="-349965" algn="l">
-              <a:lnSpc>
-                <a:spcPct val="150000"/>
-              </a:lnSpc>
-              <a:spcBef>
-                <a:spcPts val="0"/>
-              </a:spcBef>
-              <a:spcAft>
-                <a:spcPts val="0"/>
-              </a:spcAft>
+            <a:r>
+              <a:rPr sz="2000" b="0"/>
+              <a:t>Implementar um algoritmo simples</a:t>
+            </a:r>
+            <a:endParaRPr sz="2000" b="0"/>
+          </a:p>
+          <a:p>
+            <a:pPr marL="305907" indent="-305907">
               <a:buAutoNum type="arabicPeriod"/>
               <a:defRPr/>
             </a:pPr>
             <a:r>
-              <a:rPr lang="pt-BR" sz="2300" b="0" i="0" u="none" strike="noStrike" cap="none" spc="0">
-                <a:solidFill>
-                  <a:schemeClr val="dk1"/>
-                </a:solidFill>
-                <a:latin typeface="Arial"/>
-                <a:ea typeface="Arial"/>
-                <a:cs typeface="Arial"/>
-              </a:rPr>
-              <a:t>Arquivos com entrada e saída esperada para todo exercício. Alguns virão com testes automatizados;</a:t>
+              <a:rPr sz="2000" b="0"/>
+              <a:t>Deixar nosso código minimamente organizado usando referências</a:t>
             </a:r>
-            <a:endParaRPr lang="pt-BR" sz="2300" b="0" i="0" u="none" strike="noStrike" cap="none" spc="0">
-              <a:solidFill>
-                <a:schemeClr val="dk1"/>
-              </a:solidFill>
-              <a:latin typeface="Arial"/>
-              <a:ea typeface="Arial"/>
-              <a:cs typeface="Arial"/>
-            </a:endParaRPr>
-          </a:p>
-          <a:p>
-            <a:pPr marL="349965" lvl="0" indent="-349965" algn="l">
-              <a:lnSpc>
-                <a:spcPct val="150000"/>
-              </a:lnSpc>
-              <a:spcBef>
-                <a:spcPts val="0"/>
-              </a:spcBef>
-              <a:spcAft>
-                <a:spcPts val="0"/>
-              </a:spcAft>
-              <a:buAutoNum type="arabicPeriod"/>
-              <a:defRPr/>
-            </a:pPr>
-            <a:r>
-              <a:rPr lang="pt-BR" sz="2300" b="0" i="0" u="none" strike="noStrike" cap="none" spc="0">
-                <a:solidFill>
-                  <a:schemeClr val="dk1"/>
-                </a:solidFill>
-                <a:latin typeface="Arial"/>
-                <a:ea typeface="Arial"/>
-                <a:cs typeface="Arial"/>
-              </a:rPr>
-              <a:t>Algoritmos em pseudo-código.</a:t>
-            </a:r>
-            <a:endParaRPr lang="pt-BR" sz="2300" b="0" i="0" u="none" strike="noStrike" cap="none" spc="0">
-              <a:solidFill>
-                <a:schemeClr val="dk1"/>
-              </a:solidFill>
-              <a:latin typeface="Arial"/>
-              <a:ea typeface="Arial"/>
-              <a:cs typeface="Arial"/>
-            </a:endParaRPr>
-          </a:p>
-          <a:p>
-            <a:pPr marL="349965" lvl="0" indent="-349965" algn="l">
-              <a:lnSpc>
-                <a:spcPct val="150000"/>
-              </a:lnSpc>
-              <a:spcBef>
-                <a:spcPts val="0"/>
-              </a:spcBef>
-              <a:spcAft>
-                <a:spcPts val="0"/>
-              </a:spcAft>
-              <a:buAutoNum type="arabicPeriod"/>
-              <a:defRPr/>
-            </a:pPr>
-            <a:endParaRPr sz="2300" b="0" i="0" u="none" strike="noStrike" cap="none" spc="0">
-              <a:solidFill>
-                <a:schemeClr val="dk1"/>
-              </a:solidFill>
-              <a:latin typeface="Arial"/>
-              <a:ea typeface="Arial"/>
-              <a:cs typeface="Arial"/>
-            </a:endParaRPr>
-          </a:p>
-          <a:p>
-            <a:pPr lvl="0" algn="ctr">
-              <a:lnSpc>
-                <a:spcPct val="150000"/>
-              </a:lnSpc>
-              <a:spcBef>
-                <a:spcPts val="0"/>
-              </a:spcBef>
-              <a:spcAft>
-                <a:spcPts val="0"/>
-              </a:spcAft>
-              <a:defRPr/>
-            </a:pPr>
-            <a:r>
-              <a:rPr lang="pt-BR" sz="2300" b="1" i="0" u="none" strike="noStrike" cap="none" spc="0">
-                <a:solidFill>
-                  <a:schemeClr val="accent2"/>
-                </a:solidFill>
-                <a:latin typeface="Arial"/>
-                <a:ea typeface="Arial"/>
-                <a:cs typeface="Arial"/>
-              </a:rPr>
-              <a:t>Isso é tudo que um engenheiro da computação precisa para checar se sua solução está correta. </a:t>
-            </a:r>
-            <a:endParaRPr sz="2300" b="0" i="0" u="none" strike="noStrike" cap="none" spc="0">
-              <a:solidFill>
-                <a:schemeClr val="dk1"/>
-              </a:solidFill>
-              <a:latin typeface="Arial"/>
-              <a:ea typeface="Arial"/>
-              <a:cs typeface="Arial"/>
-            </a:endParaRPr>
-          </a:p>
-          <a:p>
-            <a:pPr marL="349965" lvl="0" indent="-349965" algn="l">
-              <a:lnSpc>
-                <a:spcPct val="150000"/>
-              </a:lnSpc>
-              <a:spcBef>
-                <a:spcPts val="0"/>
-              </a:spcBef>
-              <a:spcAft>
-                <a:spcPts val="0"/>
-              </a:spcAft>
-              <a:buFont typeface="Arial"/>
-              <a:buChar char="•"/>
-              <a:defRPr/>
-            </a:pPr>
-            <a:endParaRPr sz="2300" b="0" i="0" u="none" strike="noStrike" cap="none" spc="0">
-              <a:solidFill>
-                <a:schemeClr val="dk1"/>
-              </a:solidFill>
-              <a:latin typeface="Arial"/>
-              <a:ea typeface="Arial"/>
-              <a:cs typeface="Arial"/>
-            </a:endParaRPr>
-          </a:p>
-          <a:p>
-            <a:pPr marL="349965" lvl="0" indent="-349965" algn="l">
-              <a:lnSpc>
-                <a:spcPct val="150000"/>
-              </a:lnSpc>
-              <a:spcBef>
-                <a:spcPts val="0"/>
-              </a:spcBef>
-              <a:spcAft>
-                <a:spcPts val="0"/>
-              </a:spcAft>
-              <a:buFont typeface="Arial"/>
-              <a:buChar char="•"/>
-              <a:defRPr/>
-            </a:pPr>
-            <a:endParaRPr sz="2300" b="0" i="0" u="none" strike="noStrike" cap="none" spc="0">
-              <a:solidFill>
-                <a:schemeClr val="dk1"/>
-              </a:solidFill>
-              <a:latin typeface="Arial"/>
-              <a:ea typeface="Arial"/>
-              <a:cs typeface="Arial"/>
-            </a:endParaRPr>
-          </a:p>
-          <a:p>
-            <a:pPr marL="349965" lvl="0" indent="-349965" algn="l">
-              <a:lnSpc>
-                <a:spcPct val="150000"/>
-              </a:lnSpc>
-              <a:spcBef>
-                <a:spcPts val="0"/>
-              </a:spcBef>
-              <a:spcAft>
-                <a:spcPts val="0"/>
-              </a:spcAft>
-              <a:buFont typeface="Arial"/>
-              <a:buChar char="•"/>
-              <a:defRPr/>
-            </a:pPr>
-            <a:endParaRPr sz="2300" b="0" i="0" u="none" strike="noStrike" cap="none" spc="0">
-              <a:solidFill>
-                <a:schemeClr val="dk1"/>
-              </a:solidFill>
-              <a:latin typeface="Arial"/>
-              <a:ea typeface="Arial"/>
-              <a:cs typeface="Arial"/>
-            </a:endParaRPr>
-          </a:p>
-          <a:p>
-            <a:pPr marL="349965" lvl="0" indent="-349965" algn="l">
-              <a:lnSpc>
-                <a:spcPct val="150000"/>
-              </a:lnSpc>
-              <a:spcBef>
-                <a:spcPts val="0"/>
-              </a:spcBef>
-              <a:spcAft>
-                <a:spcPts val="0"/>
-              </a:spcAft>
-              <a:buFont typeface="Arial"/>
-              <a:buChar char="•"/>
-              <a:defRPr/>
-            </a:pPr>
-            <a:endParaRPr sz="2300" b="0" i="0" u="sng" strike="noStrike" cap="none">
-              <a:solidFill>
-                <a:schemeClr val="dk1"/>
-              </a:solidFill>
-              <a:latin typeface="Arial"/>
-              <a:ea typeface="Arial"/>
-              <a:cs typeface="Arial"/>
-            </a:endParaRPr>
-          </a:p>
-          <a:p>
-            <a:pPr marL="349965" lvl="0" indent="-349965" algn="l">
-              <a:lnSpc>
-                <a:spcPct val="150000"/>
-              </a:lnSpc>
-              <a:spcBef>
-                <a:spcPts val="0"/>
-              </a:spcBef>
-              <a:spcAft>
-                <a:spcPts val="0"/>
-              </a:spcAft>
-              <a:buAutoNum type="arabicPeriod"/>
-              <a:defRPr/>
-            </a:pPr>
-            <a:endParaRPr sz="2300" b="0" i="0" u="none" strike="noStrike" cap="none">
-              <a:solidFill>
-                <a:schemeClr val="dk1"/>
-              </a:solidFill>
-              <a:latin typeface="Arial"/>
-              <a:ea typeface="Arial"/>
-              <a:cs typeface="Arial"/>
-            </a:endParaRPr>
+            <a:endParaRPr sz="2000" b="0"/>
           </a:p>
         </p:txBody>
       </p:sp>
@@ -13568,6 +13306,1397 @@
 </file>
 
 <file path=ppt/slides/slide11.xml><?xml version="1.0" encoding="utf-8"?>
+<p:sld xmlns:a="http://schemas.openxmlformats.org/drawingml/2006/main" xmlns:r="http://schemas.openxmlformats.org/officeDocument/2006/relationships" xmlns:p="http://schemas.openxmlformats.org/presentationml/2006/main" xmlns:m="http://schemas.openxmlformats.org/officeDocument/2006/math" xmlns:w="http://schemas.openxmlformats.org/wordprocessingml/2006/main" showMasterPhAnim="0" show="1">
+  <p:cSld name="">
+    <p:spTree>
+      <p:nvGrpSpPr>
+        <p:cNvPr id="1" name="" hidden="0"/>
+        <p:cNvGrpSpPr/>
+        <p:nvPr isPhoto="0" userDrawn="0"/>
+      </p:nvGrpSpPr>
+      <p:grpSpPr bwMode="auto">
+        <a:xfrm>
+          <a:off x="0" y="0"/>
+          <a:ext cx="0" cy="0"/>
+          <a:chOff x="0" y="0"/>
+          <a:chExt cx="0" cy="0"/>
+        </a:xfrm>
+      </p:grpSpPr>
+      <p:sp>
+        <p:nvSpPr>
+          <p:cNvPr id="4" name="Google Shape;347;p64" hidden="0"/>
+          <p:cNvSpPr/>
+          <p:nvPr isPhoto="0" userDrawn="0"/>
+        </p:nvSpPr>
+        <p:spPr bwMode="auto">
+          <a:xfrm>
+            <a:off x="457200" y="2920659"/>
+            <a:ext cx="8228520" cy="618120"/>
+          </a:xfrm>
+          <a:prstGeom prst="rect">
+            <a:avLst/>
+          </a:prstGeom>
+          <a:noFill/>
+          <a:ln>
+            <a:noFill/>
+          </a:ln>
+        </p:spPr>
+        <p:txBody>
+          <a:bodyPr spcFirstLastPara="1" wrap="square" lIns="90000" tIns="45000" rIns="90000" bIns="45000" anchor="t" anchorCtr="0">
+            <a:noAutofit/>
+          </a:bodyPr>
+          <a:lstStyle/>
+          <a:p>
+            <a:pPr marL="0" marR="0" lvl="0" indent="0" algn="ctr">
+              <a:lnSpc>
+                <a:spcPct val="100000"/>
+              </a:lnSpc>
+              <a:spcBef>
+                <a:spcPts val="0"/>
+              </a:spcBef>
+              <a:spcAft>
+                <a:spcPts val="0"/>
+              </a:spcAft>
+              <a:buNone/>
+              <a:defRPr/>
+            </a:pPr>
+            <a:r>
+              <a:rPr lang="pt-BR" sz="3600" b="1" i="0" u="none" strike="noStrike" cap="none">
+                <a:solidFill>
+                  <a:srgbClr val="C00026"/>
+                </a:solidFill>
+                <a:latin typeface="Verdana"/>
+                <a:ea typeface="Verdana"/>
+                <a:cs typeface="Verdana"/>
+              </a:rPr>
+              <a:t>Medição de tempo</a:t>
+            </a:r>
+            <a:endParaRPr sz="3600" b="1" i="0" u="none" strike="noStrike" cap="none">
+              <a:solidFill>
+                <a:schemeClr val="dk1"/>
+              </a:solidFill>
+              <a:latin typeface="Arial"/>
+              <a:ea typeface="Arial"/>
+              <a:cs typeface="Arial"/>
+            </a:endParaRPr>
+          </a:p>
+        </p:txBody>
+      </p:sp>
+      <p:sp>
+        <p:nvSpPr>
+          <p:cNvPr id="5" name="Google Shape;348;p64" hidden="0"/>
+          <p:cNvSpPr/>
+          <p:nvPr isPhoto="0" userDrawn="0"/>
+        </p:nvSpPr>
+        <p:spPr bwMode="auto">
+          <a:xfrm>
+            <a:off x="162000" y="85680"/>
+            <a:ext cx="7228440" cy="351360"/>
+          </a:xfrm>
+          <a:prstGeom prst="rect">
+            <a:avLst/>
+          </a:prstGeom>
+          <a:noFill/>
+          <a:ln>
+            <a:noFill/>
+          </a:ln>
+        </p:spPr>
+        <p:txBody>
+          <a:bodyPr spcFirstLastPara="1" wrap="square" lIns="91422" tIns="91422" rIns="91422" bIns="91422" anchor="ctr" anchorCtr="0">
+            <a:noAutofit/>
+          </a:bodyPr>
+          <a:lstStyle/>
+          <a:p>
+            <a:pPr marL="0" lvl="0" indent="0" algn="l">
+              <a:spcBef>
+                <a:spcPts val="0"/>
+              </a:spcBef>
+              <a:spcAft>
+                <a:spcPts val="0"/>
+              </a:spcAft>
+              <a:buNone/>
+              <a:defRPr/>
+            </a:pPr>
+            <a:endParaRPr/>
+          </a:p>
+        </p:txBody>
+      </p:sp>
+      <p:sp>
+        <p:nvSpPr>
+          <p:cNvPr id="6" name="Google Shape;349;p64" hidden="0"/>
+          <p:cNvSpPr/>
+          <p:nvPr isPhoto="0" userDrawn="0"/>
+        </p:nvSpPr>
+        <p:spPr bwMode="auto">
+          <a:xfrm>
+            <a:off x="84240" y="6402240"/>
+            <a:ext cx="640440" cy="363960"/>
+          </a:xfrm>
+          <a:prstGeom prst="rect">
+            <a:avLst/>
+          </a:prstGeom>
+          <a:noFill/>
+          <a:ln>
+            <a:noFill/>
+          </a:ln>
+        </p:spPr>
+        <p:txBody>
+          <a:bodyPr spcFirstLastPara="1" wrap="square" lIns="90000" tIns="45000" rIns="90000" bIns="45000" anchor="ctr" anchorCtr="0">
+            <a:noAutofit/>
+          </a:bodyPr>
+          <a:lstStyle/>
+          <a:p>
+            <a:pPr marL="0" marR="0" lvl="0" indent="0" algn="r">
+              <a:lnSpc>
+                <a:spcPct val="100000"/>
+              </a:lnSpc>
+              <a:spcBef>
+                <a:spcPts val="0"/>
+              </a:spcBef>
+              <a:spcAft>
+                <a:spcPts val="0"/>
+              </a:spcAft>
+              <a:buNone/>
+              <a:defRPr/>
+            </a:pPr>
+            <a:fld id="{C2581D0F-81C8-5D84-8B47-C810591E47F2}" type="slidenum">
+              <a:rPr lang="pt-BR" sz="1000" b="0" i="0" u="none" strike="noStrike" cap="none">
+                <a:solidFill>
+                  <a:srgbClr val="B2B2B2"/>
+                </a:solidFill>
+                <a:latin typeface="Verdana"/>
+                <a:ea typeface="Verdana"/>
+                <a:cs typeface="Verdana"/>
+              </a:rPr>
+              <a:t/>
+            </a:fld>
+            <a:endParaRPr sz="1000" b="0" i="0" u="none" strike="noStrike" cap="none">
+              <a:solidFill>
+                <a:schemeClr val="dk1"/>
+              </a:solidFill>
+              <a:latin typeface="Arial"/>
+              <a:ea typeface="Arial"/>
+              <a:cs typeface="Arial"/>
+            </a:endParaRPr>
+          </a:p>
+        </p:txBody>
+      </p:sp>
+    </p:spTree>
+  </p:cSld>
+  <p:clrMapOvr>
+    <a:masterClrMapping/>
+  </p:clrMapOvr>
+  <mc:AlternateContent xmlns:mc="http://schemas.openxmlformats.org/markup-compatibility/2006">
+    <mc:Choice xmlns:p14="http://schemas.microsoft.com/office/powerpoint/2010/main" Requires="p14">
+      <p:transition p14:dur="2000" advClick="1"/>
+    </mc:Choice>
+    <mc:Fallback>
+      <p:transition advClick="1"/>
+    </mc:Fallback>
+  </mc:AlternateContent>
+</p:sld>
+</file>
+
+<file path=ppt/slides/slide12.xml><?xml version="1.0" encoding="utf-8"?>
+<p:sld xmlns:a="http://schemas.openxmlformats.org/drawingml/2006/main" xmlns:r="http://schemas.openxmlformats.org/officeDocument/2006/relationships" xmlns:p="http://schemas.openxmlformats.org/presentationml/2006/main" xmlns:m="http://schemas.openxmlformats.org/officeDocument/2006/math" xmlns:w="http://schemas.openxmlformats.org/wordprocessingml/2006/main" showMasterPhAnim="0" show="1">
+  <p:cSld name="">
+    <p:spTree>
+      <p:nvGrpSpPr>
+        <p:cNvPr id="1" name="" hidden="0"/>
+        <p:cNvGrpSpPr/>
+        <p:nvPr isPhoto="0" userDrawn="0"/>
+      </p:nvGrpSpPr>
+      <p:grpSpPr bwMode="auto">
+        <a:xfrm>
+          <a:off x="0" y="0"/>
+          <a:ext cx="0" cy="0"/>
+          <a:chOff x="0" y="0"/>
+          <a:chExt cx="0" cy="0"/>
+        </a:xfrm>
+      </p:grpSpPr>
+      <p:sp>
+        <p:nvSpPr>
+          <p:cNvPr id="4" name="Google Shape;267;p55" hidden="0"/>
+          <p:cNvSpPr/>
+          <p:nvPr isPhoto="0" userDrawn="0"/>
+        </p:nvSpPr>
+        <p:spPr bwMode="auto">
+          <a:xfrm>
+            <a:off x="457200" y="781200"/>
+            <a:ext cx="8228520" cy="618120"/>
+          </a:xfrm>
+          <a:prstGeom prst="rect">
+            <a:avLst/>
+          </a:prstGeom>
+          <a:noFill/>
+          <a:ln>
+            <a:noFill/>
+          </a:ln>
+        </p:spPr>
+        <p:txBody>
+          <a:bodyPr spcFirstLastPara="1" wrap="square" lIns="90000" tIns="45000" rIns="90000" bIns="45000" anchor="t" anchorCtr="0">
+            <a:noAutofit/>
+          </a:bodyPr>
+          <a:lstStyle/>
+          <a:p>
+            <a:pPr marL="0" marR="0" lvl="0" indent="0" algn="l">
+              <a:lnSpc>
+                <a:spcPct val="100000"/>
+              </a:lnSpc>
+              <a:spcBef>
+                <a:spcPts val="0"/>
+              </a:spcBef>
+              <a:spcAft>
+                <a:spcPts val="0"/>
+              </a:spcAft>
+              <a:buNone/>
+              <a:defRPr/>
+            </a:pPr>
+            <a:r>
+              <a:rPr lang="pt-BR" sz="3200" b="0" i="0" u="none" strike="noStrike" cap="none">
+                <a:solidFill>
+                  <a:srgbClr val="C00026"/>
+                </a:solidFill>
+                <a:latin typeface="Verdana"/>
+                <a:ea typeface="Verdana"/>
+                <a:cs typeface="Verdana"/>
+              </a:rPr>
+              <a:t>Profiling</a:t>
+            </a:r>
+            <a:endParaRPr sz="3200" b="0" i="0" u="none" strike="noStrike" cap="none">
+              <a:solidFill>
+                <a:schemeClr val="dk1"/>
+              </a:solidFill>
+              <a:latin typeface="Arial"/>
+              <a:ea typeface="Arial"/>
+              <a:cs typeface="Arial"/>
+            </a:endParaRPr>
+          </a:p>
+        </p:txBody>
+      </p:sp>
+      <p:sp>
+        <p:nvSpPr>
+          <p:cNvPr id="5" name="Google Shape;268;p55" hidden="0"/>
+          <p:cNvSpPr/>
+          <p:nvPr isPhoto="0" userDrawn="0"/>
+        </p:nvSpPr>
+        <p:spPr bwMode="auto">
+          <a:xfrm>
+            <a:off x="162000" y="85680"/>
+            <a:ext cx="7228440" cy="351360"/>
+          </a:xfrm>
+          <a:prstGeom prst="rect">
+            <a:avLst/>
+          </a:prstGeom>
+          <a:noFill/>
+          <a:ln>
+            <a:noFill/>
+          </a:ln>
+        </p:spPr>
+        <p:txBody>
+          <a:bodyPr spcFirstLastPara="1" wrap="square" lIns="91422" tIns="91422" rIns="91422" bIns="91422" anchor="ctr" anchorCtr="0">
+            <a:noAutofit/>
+          </a:bodyPr>
+          <a:lstStyle/>
+          <a:p>
+            <a:pPr marL="0" lvl="0" indent="0" algn="l">
+              <a:spcBef>
+                <a:spcPts val="0"/>
+              </a:spcBef>
+              <a:spcAft>
+                <a:spcPts val="0"/>
+              </a:spcAft>
+              <a:buNone/>
+              <a:defRPr/>
+            </a:pPr>
+            <a:endParaRPr/>
+          </a:p>
+        </p:txBody>
+      </p:sp>
+      <p:sp>
+        <p:nvSpPr>
+          <p:cNvPr id="6" name="Google Shape;269;p55" hidden="0"/>
+          <p:cNvSpPr/>
+          <p:nvPr isPhoto="0" userDrawn="0"/>
+        </p:nvSpPr>
+        <p:spPr bwMode="auto">
+          <a:xfrm>
+            <a:off x="84240" y="6402240"/>
+            <a:ext cx="640440" cy="363960"/>
+          </a:xfrm>
+          <a:prstGeom prst="rect">
+            <a:avLst/>
+          </a:prstGeom>
+          <a:noFill/>
+          <a:ln>
+            <a:noFill/>
+          </a:ln>
+        </p:spPr>
+        <p:txBody>
+          <a:bodyPr spcFirstLastPara="1" wrap="square" lIns="90000" tIns="45000" rIns="90000" bIns="45000" anchor="ctr" anchorCtr="0">
+            <a:noAutofit/>
+          </a:bodyPr>
+          <a:lstStyle/>
+          <a:p>
+            <a:pPr marL="0" marR="0" lvl="0" indent="0" algn="r">
+              <a:lnSpc>
+                <a:spcPct val="100000"/>
+              </a:lnSpc>
+              <a:spcBef>
+                <a:spcPts val="0"/>
+              </a:spcBef>
+              <a:spcAft>
+                <a:spcPts val="0"/>
+              </a:spcAft>
+              <a:buNone/>
+              <a:defRPr/>
+            </a:pPr>
+            <a:fld id="{2AEA4DEC-F606-9A77-49F9-6F4328295D55}" type="slidenum">
+              <a:rPr lang="pt-BR" sz="1000" b="0" i="0" u="none" strike="noStrike" cap="none">
+                <a:solidFill>
+                  <a:srgbClr val="B2B2B2"/>
+                </a:solidFill>
+                <a:latin typeface="Verdana"/>
+                <a:ea typeface="Verdana"/>
+                <a:cs typeface="Verdana"/>
+              </a:rPr>
+              <a:t/>
+            </a:fld>
+            <a:endParaRPr sz="1000" b="0" i="0" u="none" strike="noStrike" cap="none">
+              <a:solidFill>
+                <a:schemeClr val="dk1"/>
+              </a:solidFill>
+              <a:latin typeface="Arial"/>
+              <a:ea typeface="Arial"/>
+              <a:cs typeface="Arial"/>
+            </a:endParaRPr>
+          </a:p>
+        </p:txBody>
+      </p:sp>
+      <p:sp>
+        <p:nvSpPr>
+          <p:cNvPr id="7" name="Google Shape;270;p55" hidden="0"/>
+          <p:cNvSpPr>
+            <a:spLocks noAdjustHandles="0" noChangeArrowheads="0"/>
+          </p:cNvSpPr>
+          <p:nvPr isPhoto="0" userDrawn="0"/>
+        </p:nvSpPr>
+        <p:spPr bwMode="auto">
+          <a:xfrm flipH="0" flipV="0">
+            <a:off x="309227" y="1588487"/>
+            <a:ext cx="8704381" cy="4976428"/>
+          </a:xfrm>
+          <a:prstGeom prst="rect">
+            <a:avLst/>
+          </a:prstGeom>
+          <a:noFill/>
+          <a:ln>
+            <a:noFill/>
+          </a:ln>
+        </p:spPr>
+        <p:txBody>
+          <a:bodyPr spcFirstLastPara="1" wrap="square" lIns="91422" tIns="45696" rIns="91422" bIns="45696" anchor="t" anchorCtr="0">
+            <a:noAutofit/>
+          </a:bodyPr>
+          <a:lstStyle/>
+          <a:p>
+            <a:pPr algn="l">
+              <a:defRPr/>
+            </a:pPr>
+            <a:endParaRPr sz="2400" b="1" u="sng">
+              <a:solidFill>
+                <a:schemeClr val="accent2"/>
+              </a:solidFill>
+            </a:endParaRPr>
+          </a:p>
+          <a:p>
+            <a:pPr algn="l">
+              <a:defRPr/>
+            </a:pPr>
+            <a:endParaRPr sz="2400" b="1" u="sng">
+              <a:solidFill>
+                <a:schemeClr val="accent2"/>
+              </a:solidFill>
+            </a:endParaRPr>
+          </a:p>
+          <a:p>
+            <a:pPr algn="ctr">
+              <a:defRPr/>
+            </a:pPr>
+            <a:r>
+              <a:rPr sz="2800" b="0" u="none">
+                <a:solidFill>
+                  <a:schemeClr val="tx1"/>
+                </a:solidFill>
+              </a:rPr>
+              <a:t>Análise de um programa durante sua execução para determinar seu consumo de memória e/ou tempo.</a:t>
+            </a:r>
+            <a:endParaRPr sz="2800" b="0" u="none">
+              <a:solidFill>
+                <a:schemeClr val="tx1"/>
+              </a:solidFill>
+            </a:endParaRPr>
+          </a:p>
+          <a:p>
+            <a:pPr algn="ctr">
+              <a:defRPr/>
+            </a:pPr>
+            <a:endParaRPr sz="2800" b="1" u="sng">
+              <a:solidFill>
+                <a:schemeClr val="accent2">
+                  <a:lumMod val="75000"/>
+                </a:schemeClr>
+              </a:solidFill>
+            </a:endParaRPr>
+          </a:p>
+          <a:p>
+            <a:pPr algn="l">
+              <a:defRPr/>
+            </a:pPr>
+            <a:endParaRPr sz="2400" b="0" u="none">
+              <a:solidFill>
+                <a:schemeClr val="tx1"/>
+              </a:solidFill>
+            </a:endParaRPr>
+          </a:p>
+          <a:p>
+            <a:pPr algn="l">
+              <a:defRPr/>
+            </a:pPr>
+            <a:r>
+              <a:rPr sz="2400" b="0" u="none">
+                <a:solidFill>
+                  <a:schemeClr val="tx1"/>
+                </a:solidFill>
+              </a:rPr>
+              <a:t>Podemos responder duas importantes perguntas:</a:t>
+            </a:r>
+            <a:endParaRPr sz="2400" b="0" u="none">
+              <a:solidFill>
+                <a:schemeClr val="tx1"/>
+              </a:solidFill>
+            </a:endParaRPr>
+          </a:p>
+          <a:p>
+            <a:pPr algn="l">
+              <a:defRPr/>
+            </a:pPr>
+            <a:endParaRPr sz="2400" b="0" u="none">
+              <a:solidFill>
+                <a:schemeClr val="tx1"/>
+              </a:solidFill>
+            </a:endParaRPr>
+          </a:p>
+          <a:p>
+            <a:pPr marL="394022" indent="-394022" algn="l">
+              <a:buFont typeface="Arial"/>
+              <a:buChar char="•"/>
+              <a:defRPr/>
+            </a:pPr>
+            <a:r>
+              <a:rPr sz="2400" b="0" u="none">
+                <a:solidFill>
+                  <a:schemeClr val="tx1"/>
+                </a:solidFill>
+              </a:rPr>
+              <a:t>onde o programa consome mais recursos?</a:t>
+            </a:r>
+            <a:endParaRPr sz="2400" b="0" u="none">
+              <a:solidFill>
+                <a:schemeClr val="tx1"/>
+              </a:solidFill>
+            </a:endParaRPr>
+          </a:p>
+          <a:p>
+            <a:pPr marL="394022" indent="-394022" algn="l">
+              <a:buFont typeface="Arial"/>
+              <a:buChar char="•"/>
+              <a:defRPr/>
+            </a:pPr>
+            <a:r>
+              <a:rPr sz="2400" b="0" u="none">
+                <a:solidFill>
+                  <a:schemeClr val="tx1"/>
+                </a:solidFill>
+              </a:rPr>
+              <a:t>onde devo concentrar meus esforços de otimização?</a:t>
+            </a:r>
+            <a:endParaRPr sz="2400" b="0" u="none">
+              <a:solidFill>
+                <a:schemeClr val="tx1"/>
+              </a:solidFill>
+            </a:endParaRPr>
+          </a:p>
+          <a:p>
+            <a:pPr marL="394022" indent="-394022" algn="l">
+              <a:buFont typeface="Arial"/>
+              <a:buChar char="•"/>
+              <a:defRPr/>
+            </a:pPr>
+            <a:endParaRPr sz="2800" b="0" u="none">
+              <a:solidFill>
+                <a:schemeClr val="tx1"/>
+              </a:solidFill>
+            </a:endParaRPr>
+          </a:p>
+        </p:txBody>
+      </p:sp>
+    </p:spTree>
+  </p:cSld>
+  <p:clrMapOvr>
+    <a:masterClrMapping/>
+  </p:clrMapOvr>
+  <mc:AlternateContent xmlns:mc="http://schemas.openxmlformats.org/markup-compatibility/2006">
+    <mc:Choice xmlns:p14="http://schemas.microsoft.com/office/powerpoint/2010/main" Requires="p14">
+      <p:transition p14:dur="2000" advClick="1"/>
+    </mc:Choice>
+    <mc:Fallback>
+      <p:transition advClick="1"/>
+    </mc:Fallback>
+  </mc:AlternateContent>
+</p:sld>
+</file>
+
+<file path=ppt/slides/slide13.xml><?xml version="1.0" encoding="utf-8"?>
+<p:sld xmlns:a="http://schemas.openxmlformats.org/drawingml/2006/main" xmlns:r="http://schemas.openxmlformats.org/officeDocument/2006/relationships" xmlns:p="http://schemas.openxmlformats.org/presentationml/2006/main" xmlns:m="http://schemas.openxmlformats.org/officeDocument/2006/math" xmlns:w="http://schemas.openxmlformats.org/wordprocessingml/2006/main" showMasterPhAnim="0" show="1">
+  <p:cSld name="">
+    <p:spTree>
+      <p:nvGrpSpPr>
+        <p:cNvPr id="1" name="" hidden="0"/>
+        <p:cNvGrpSpPr/>
+        <p:nvPr isPhoto="0" userDrawn="0"/>
+      </p:nvGrpSpPr>
+      <p:grpSpPr bwMode="auto">
+        <a:xfrm>
+          <a:off x="0" y="0"/>
+          <a:ext cx="0" cy="0"/>
+          <a:chOff x="0" y="0"/>
+          <a:chExt cx="0" cy="0"/>
+        </a:xfrm>
+      </p:grpSpPr>
+      <p:sp>
+        <p:nvSpPr>
+          <p:cNvPr id="4" name="Google Shape;267;p55" hidden="0"/>
+          <p:cNvSpPr/>
+          <p:nvPr isPhoto="0" userDrawn="0"/>
+        </p:nvSpPr>
+        <p:spPr bwMode="auto">
+          <a:xfrm>
+            <a:off x="457200" y="781200"/>
+            <a:ext cx="8228520" cy="618120"/>
+          </a:xfrm>
+          <a:prstGeom prst="rect">
+            <a:avLst/>
+          </a:prstGeom>
+          <a:noFill/>
+          <a:ln>
+            <a:noFill/>
+          </a:ln>
+        </p:spPr>
+        <p:txBody>
+          <a:bodyPr spcFirstLastPara="1" wrap="square" lIns="90000" tIns="45000" rIns="90000" bIns="45000" anchor="t" anchorCtr="0">
+            <a:noAutofit/>
+          </a:bodyPr>
+          <a:lstStyle/>
+          <a:p>
+            <a:pPr marL="0" marR="0" lvl="0" indent="0" algn="l">
+              <a:lnSpc>
+                <a:spcPct val="100000"/>
+              </a:lnSpc>
+              <a:spcBef>
+                <a:spcPts val="0"/>
+              </a:spcBef>
+              <a:spcAft>
+                <a:spcPts val="0"/>
+              </a:spcAft>
+              <a:buNone/>
+              <a:defRPr/>
+            </a:pPr>
+            <a:r>
+              <a:rPr lang="pt-BR" sz="3200" b="0" i="0" u="none" strike="noStrike" cap="none">
+                <a:solidFill>
+                  <a:srgbClr val="C00026"/>
+                </a:solidFill>
+                <a:latin typeface="Verdana"/>
+                <a:ea typeface="Verdana"/>
+                <a:cs typeface="Verdana"/>
+              </a:rPr>
+              <a:t>KCachegrind</a:t>
+            </a:r>
+            <a:endParaRPr sz="3200" b="0" i="0" u="none" strike="noStrike" cap="none">
+              <a:solidFill>
+                <a:schemeClr val="dk1"/>
+              </a:solidFill>
+              <a:latin typeface="Arial"/>
+              <a:ea typeface="Arial"/>
+              <a:cs typeface="Arial"/>
+            </a:endParaRPr>
+          </a:p>
+        </p:txBody>
+      </p:sp>
+      <p:sp>
+        <p:nvSpPr>
+          <p:cNvPr id="5" name="Google Shape;268;p55" hidden="0"/>
+          <p:cNvSpPr/>
+          <p:nvPr isPhoto="0" userDrawn="0"/>
+        </p:nvSpPr>
+        <p:spPr bwMode="auto">
+          <a:xfrm>
+            <a:off x="162000" y="85680"/>
+            <a:ext cx="7228440" cy="351360"/>
+          </a:xfrm>
+          <a:prstGeom prst="rect">
+            <a:avLst/>
+          </a:prstGeom>
+          <a:noFill/>
+          <a:ln>
+            <a:noFill/>
+          </a:ln>
+        </p:spPr>
+        <p:txBody>
+          <a:bodyPr spcFirstLastPara="1" wrap="square" lIns="91422" tIns="91422" rIns="91422" bIns="91422" anchor="ctr" anchorCtr="0">
+            <a:noAutofit/>
+          </a:bodyPr>
+          <a:lstStyle/>
+          <a:p>
+            <a:pPr marL="0" lvl="0" indent="0" algn="l">
+              <a:spcBef>
+                <a:spcPts val="0"/>
+              </a:spcBef>
+              <a:spcAft>
+                <a:spcPts val="0"/>
+              </a:spcAft>
+              <a:buNone/>
+              <a:defRPr/>
+            </a:pPr>
+            <a:endParaRPr/>
+          </a:p>
+        </p:txBody>
+      </p:sp>
+      <p:sp>
+        <p:nvSpPr>
+          <p:cNvPr id="6" name="Google Shape;269;p55" hidden="0"/>
+          <p:cNvSpPr/>
+          <p:nvPr isPhoto="0" userDrawn="0"/>
+        </p:nvSpPr>
+        <p:spPr bwMode="auto">
+          <a:xfrm>
+            <a:off x="84240" y="6402240"/>
+            <a:ext cx="640440" cy="363960"/>
+          </a:xfrm>
+          <a:prstGeom prst="rect">
+            <a:avLst/>
+          </a:prstGeom>
+          <a:noFill/>
+          <a:ln>
+            <a:noFill/>
+          </a:ln>
+        </p:spPr>
+        <p:txBody>
+          <a:bodyPr spcFirstLastPara="1" wrap="square" lIns="90000" tIns="45000" rIns="90000" bIns="45000" anchor="ctr" anchorCtr="0">
+            <a:noAutofit/>
+          </a:bodyPr>
+          <a:lstStyle/>
+          <a:p>
+            <a:pPr marL="0" marR="0" lvl="0" indent="0" algn="r">
+              <a:lnSpc>
+                <a:spcPct val="100000"/>
+              </a:lnSpc>
+              <a:spcBef>
+                <a:spcPts val="0"/>
+              </a:spcBef>
+              <a:spcAft>
+                <a:spcPts val="0"/>
+              </a:spcAft>
+              <a:buNone/>
+              <a:defRPr/>
+            </a:pPr>
+            <a:fld id="{68375C5C-0F1F-37C0-9399-D2618FFD1B99}" type="slidenum">
+              <a:rPr lang="pt-BR" sz="1000" b="0" i="0" u="none" strike="noStrike" cap="none">
+                <a:solidFill>
+                  <a:srgbClr val="B2B2B2"/>
+                </a:solidFill>
+                <a:latin typeface="Verdana"/>
+                <a:ea typeface="Verdana"/>
+                <a:cs typeface="Verdana"/>
+              </a:rPr>
+              <a:t/>
+            </a:fld>
+            <a:endParaRPr sz="1000" b="0" i="0" u="none" strike="noStrike" cap="none">
+              <a:solidFill>
+                <a:schemeClr val="dk1"/>
+              </a:solidFill>
+              <a:latin typeface="Arial"/>
+              <a:ea typeface="Arial"/>
+              <a:cs typeface="Arial"/>
+            </a:endParaRPr>
+          </a:p>
+        </p:txBody>
+      </p:sp>
+      <p:sp>
+        <p:nvSpPr>
+          <p:cNvPr id="7" name="Google Shape;270;p55" hidden="0"/>
+          <p:cNvSpPr>
+            <a:spLocks noAdjustHandles="0" noChangeArrowheads="0"/>
+          </p:cNvSpPr>
+          <p:nvPr isPhoto="0" userDrawn="0"/>
+        </p:nvSpPr>
+        <p:spPr bwMode="auto">
+          <a:xfrm flipH="0" flipV="0">
+            <a:off x="309227" y="1588487"/>
+            <a:ext cx="8704381" cy="4976428"/>
+          </a:xfrm>
+          <a:prstGeom prst="rect">
+            <a:avLst/>
+          </a:prstGeom>
+          <a:noFill/>
+          <a:ln>
+            <a:noFill/>
+          </a:ln>
+        </p:spPr>
+        <p:txBody>
+          <a:bodyPr spcFirstLastPara="1" wrap="square" lIns="91422" tIns="45696" rIns="91422" bIns="45696" anchor="t" anchorCtr="0">
+            <a:noAutofit/>
+          </a:bodyPr>
+          <a:lstStyle/>
+          <a:p>
+            <a:pPr>
+              <a:defRPr/>
+            </a:pPr>
+            <a:endParaRPr/>
+          </a:p>
+        </p:txBody>
+      </p:sp>
+      <p:pic>
+        <p:nvPicPr>
+          <p:cNvPr id="8" name="" hidden="0"/>
+          <p:cNvPicPr>
+            <a:picLocks noChangeAspect="1"/>
+          </p:cNvPicPr>
+          <p:nvPr isPhoto="0" userDrawn="0"/>
+        </p:nvPicPr>
+        <p:blipFill>
+          <a:blip r:embed="rId2"/>
+          <a:stretch/>
+        </p:blipFill>
+        <p:spPr bwMode="auto">
+          <a:xfrm flipH="0" flipV="0">
+            <a:off x="404460" y="1526177"/>
+            <a:ext cx="8227244" cy="4460067"/>
+          </a:xfrm>
+          <a:prstGeom prst="rect">
+            <a:avLst/>
+          </a:prstGeom>
+        </p:spPr>
+      </p:pic>
+    </p:spTree>
+  </p:cSld>
+  <p:clrMapOvr>
+    <a:masterClrMapping/>
+  </p:clrMapOvr>
+  <mc:AlternateContent xmlns:mc="http://schemas.openxmlformats.org/markup-compatibility/2006">
+    <mc:Choice xmlns:p14="http://schemas.microsoft.com/office/powerpoint/2010/main" Requires="p14">
+      <p:transition p14:dur="2000" advClick="1"/>
+    </mc:Choice>
+    <mc:Fallback>
+      <p:transition advClick="1"/>
+    </mc:Fallback>
+  </mc:AlternateContent>
+</p:sld>
+</file>
+
+<file path=ppt/slides/slide14.xml><?xml version="1.0" encoding="utf-8"?>
+<p:sld xmlns:a="http://schemas.openxmlformats.org/drawingml/2006/main" xmlns:r="http://schemas.openxmlformats.org/officeDocument/2006/relationships" xmlns:p="http://schemas.openxmlformats.org/presentationml/2006/main" xmlns:m="http://schemas.openxmlformats.org/officeDocument/2006/math" xmlns:w="http://schemas.openxmlformats.org/wordprocessingml/2006/main" showMasterPhAnim="0" show="1">
+  <p:cSld name="">
+    <p:spTree>
+      <p:nvGrpSpPr>
+        <p:cNvPr id="1" name="" hidden="0"/>
+        <p:cNvGrpSpPr/>
+        <p:nvPr isPhoto="0" userDrawn="0"/>
+      </p:nvGrpSpPr>
+      <p:grpSpPr bwMode="auto">
+        <a:xfrm>
+          <a:off x="0" y="0"/>
+          <a:ext cx="0" cy="0"/>
+          <a:chOff x="0" y="0"/>
+          <a:chExt cx="0" cy="0"/>
+        </a:xfrm>
+      </p:grpSpPr>
+      <p:sp>
+        <p:nvSpPr>
+          <p:cNvPr id="4" name="Google Shape;347;p64" hidden="0"/>
+          <p:cNvSpPr/>
+          <p:nvPr isPhoto="0" userDrawn="0"/>
+        </p:nvSpPr>
+        <p:spPr bwMode="auto">
+          <a:xfrm>
+            <a:off x="457200" y="2920659"/>
+            <a:ext cx="8228520" cy="618120"/>
+          </a:xfrm>
+          <a:prstGeom prst="rect">
+            <a:avLst/>
+          </a:prstGeom>
+          <a:noFill/>
+          <a:ln>
+            <a:noFill/>
+          </a:ln>
+        </p:spPr>
+        <p:txBody>
+          <a:bodyPr spcFirstLastPara="1" wrap="square" lIns="90000" tIns="45000" rIns="90000" bIns="45000" anchor="t" anchorCtr="0">
+            <a:noAutofit/>
+          </a:bodyPr>
+          <a:lstStyle/>
+          <a:p>
+            <a:pPr marL="0" marR="0" lvl="0" indent="0" algn="ctr">
+              <a:lnSpc>
+                <a:spcPct val="100000"/>
+              </a:lnSpc>
+              <a:spcBef>
+                <a:spcPts val="0"/>
+              </a:spcBef>
+              <a:spcAft>
+                <a:spcPts val="0"/>
+              </a:spcAft>
+              <a:buNone/>
+              <a:defRPr/>
+            </a:pPr>
+            <a:r>
+              <a:rPr lang="pt-BR" sz="3600" b="1" i="0" u="none" strike="noStrike" cap="none">
+                <a:solidFill>
+                  <a:srgbClr val="C00026"/>
+                </a:solidFill>
+                <a:latin typeface="Verdana"/>
+                <a:ea typeface="Verdana"/>
+                <a:cs typeface="Verdana"/>
+              </a:rPr>
+              <a:t>Atividade prática</a:t>
+            </a:r>
+            <a:endParaRPr sz="3600" b="1" i="0" u="none" strike="noStrike" cap="none">
+              <a:solidFill>
+                <a:schemeClr val="dk1"/>
+              </a:solidFill>
+              <a:latin typeface="Arial"/>
+              <a:ea typeface="Arial"/>
+              <a:cs typeface="Arial"/>
+            </a:endParaRPr>
+          </a:p>
+        </p:txBody>
+      </p:sp>
+      <p:sp>
+        <p:nvSpPr>
+          <p:cNvPr id="5" name="Google Shape;348;p64" hidden="0"/>
+          <p:cNvSpPr/>
+          <p:nvPr isPhoto="0" userDrawn="0"/>
+        </p:nvSpPr>
+        <p:spPr bwMode="auto">
+          <a:xfrm>
+            <a:off x="162000" y="85680"/>
+            <a:ext cx="7228440" cy="351360"/>
+          </a:xfrm>
+          <a:prstGeom prst="rect">
+            <a:avLst/>
+          </a:prstGeom>
+          <a:noFill/>
+          <a:ln>
+            <a:noFill/>
+          </a:ln>
+        </p:spPr>
+        <p:txBody>
+          <a:bodyPr spcFirstLastPara="1" wrap="square" lIns="91422" tIns="91422" rIns="91422" bIns="91422" anchor="ctr" anchorCtr="0">
+            <a:noAutofit/>
+          </a:bodyPr>
+          <a:lstStyle/>
+          <a:p>
+            <a:pPr marL="0" lvl="0" indent="0" algn="l">
+              <a:spcBef>
+                <a:spcPts val="0"/>
+              </a:spcBef>
+              <a:spcAft>
+                <a:spcPts val="0"/>
+              </a:spcAft>
+              <a:buNone/>
+              <a:defRPr/>
+            </a:pPr>
+            <a:endParaRPr/>
+          </a:p>
+        </p:txBody>
+      </p:sp>
+      <p:sp>
+        <p:nvSpPr>
+          <p:cNvPr id="6" name="Google Shape;349;p64" hidden="0"/>
+          <p:cNvSpPr/>
+          <p:nvPr isPhoto="0" userDrawn="0"/>
+        </p:nvSpPr>
+        <p:spPr bwMode="auto">
+          <a:xfrm>
+            <a:off x="84240" y="6402240"/>
+            <a:ext cx="640440" cy="363960"/>
+          </a:xfrm>
+          <a:prstGeom prst="rect">
+            <a:avLst/>
+          </a:prstGeom>
+          <a:noFill/>
+          <a:ln>
+            <a:noFill/>
+          </a:ln>
+        </p:spPr>
+        <p:txBody>
+          <a:bodyPr spcFirstLastPara="1" wrap="square" lIns="90000" tIns="45000" rIns="90000" bIns="45000" anchor="ctr" anchorCtr="0">
+            <a:noAutofit/>
+          </a:bodyPr>
+          <a:lstStyle/>
+          <a:p>
+            <a:pPr marL="0" marR="0" lvl="0" indent="0" algn="r">
+              <a:lnSpc>
+                <a:spcPct val="100000"/>
+              </a:lnSpc>
+              <a:spcBef>
+                <a:spcPts val="0"/>
+              </a:spcBef>
+              <a:spcAft>
+                <a:spcPts val="0"/>
+              </a:spcAft>
+              <a:buNone/>
+              <a:defRPr/>
+            </a:pPr>
+            <a:fld id="{97EB1981-4163-74B3-5B47-4934A2BD21C9}" type="slidenum">
+              <a:rPr lang="pt-BR" sz="1000" b="0" i="0" u="none" strike="noStrike" cap="none">
+                <a:solidFill>
+                  <a:srgbClr val="B2B2B2"/>
+                </a:solidFill>
+                <a:latin typeface="Verdana"/>
+                <a:ea typeface="Verdana"/>
+                <a:cs typeface="Verdana"/>
+              </a:rPr>
+              <a:t/>
+            </a:fld>
+            <a:endParaRPr sz="1000" b="0" i="0" u="none" strike="noStrike" cap="none">
+              <a:solidFill>
+                <a:schemeClr val="dk1"/>
+              </a:solidFill>
+              <a:latin typeface="Arial"/>
+              <a:ea typeface="Arial"/>
+              <a:cs typeface="Arial"/>
+            </a:endParaRPr>
+          </a:p>
+        </p:txBody>
+      </p:sp>
+      <p:sp>
+        <p:nvSpPr>
+          <p:cNvPr id="7" name="" hidden="0"/>
+          <p:cNvSpPr/>
+          <p:nvPr isPhoto="0" userDrawn="0"/>
+        </p:nvSpPr>
+        <p:spPr bwMode="auto">
+          <a:xfrm flipH="0" flipV="0">
+            <a:off x="724677" y="4088421"/>
+            <a:ext cx="8137933" cy="363449"/>
+          </a:xfrm>
+          <a:prstGeom prst="rect">
+            <a:avLst/>
+          </a:prstGeom>
+          <a:noFill/>
+        </p:spPr>
+        <p:txBody>
+          <a:bodyPr vertOverflow="overflow" horzOverflow="clip" vert="horz" wrap="square" lIns="91440" tIns="45720" rIns="91440" bIns="45720" numCol="1" spcCol="0" rtlCol="0" fromWordArt="0" anchor="t" anchorCtr="0" forceAA="0" upright="0" compatLnSpc="0">
+            <a:noAutofit/>
+          </a:bodyPr>
+          <a:p>
+            <a:pPr>
+              <a:defRPr/>
+            </a:pPr>
+            <a:r>
+              <a:rPr sz="2000" b="1"/>
+              <a:t>Uma primeira tentativa de otimização</a:t>
+            </a:r>
+            <a:endParaRPr sz="2000" b="1"/>
+          </a:p>
+          <a:p>
+            <a:pPr>
+              <a:defRPr/>
+            </a:pPr>
+            <a:endParaRPr sz="2000"/>
+          </a:p>
+          <a:p>
+            <a:pPr marL="305907" indent="-305907">
+              <a:buAutoNum type="arabicPeriod"/>
+              <a:defRPr/>
+            </a:pPr>
+            <a:r>
+              <a:rPr sz="2000" b="0"/>
+              <a:t>Implementar uma otimização simples</a:t>
+            </a:r>
+            <a:endParaRPr sz="2000" b="0"/>
+          </a:p>
+          <a:p>
+            <a:pPr marL="305906" indent="-305906">
+              <a:buAutoNum type="arabicPeriod"/>
+              <a:defRPr/>
+            </a:pPr>
+            <a:r>
+              <a:rPr sz="2000" b="0"/>
+              <a:t>Verificar se houve melhora usando o KCachegrind</a:t>
+            </a:r>
+            <a:endParaRPr sz="2000" b="0"/>
+          </a:p>
+        </p:txBody>
+      </p:sp>
+    </p:spTree>
+  </p:cSld>
+  <p:clrMapOvr>
+    <a:masterClrMapping/>
+  </p:clrMapOvr>
+  <mc:AlternateContent xmlns:mc="http://schemas.openxmlformats.org/markup-compatibility/2006">
+    <mc:Choice xmlns:p14="http://schemas.microsoft.com/office/powerpoint/2010/main" Requires="p14">
+      <p:transition p14:dur="2000" advClick="1"/>
+    </mc:Choice>
+    <mc:Fallback>
+      <p:transition advClick="1"/>
+    </mc:Fallback>
+  </mc:AlternateContent>
+</p:sld>
+</file>
+
+<file path=ppt/slides/slide15.xml><?xml version="1.0" encoding="utf-8"?>
+<p:sld xmlns:a="http://schemas.openxmlformats.org/drawingml/2006/main" xmlns:r="http://schemas.openxmlformats.org/officeDocument/2006/relationships" xmlns:p="http://schemas.openxmlformats.org/presentationml/2006/main" xmlns:m="http://schemas.openxmlformats.org/officeDocument/2006/math" xmlns:w="http://schemas.openxmlformats.org/wordprocessingml/2006/main" showMasterPhAnim="0" show="1">
+  <p:cSld name="">
+    <p:spTree>
+      <p:nvGrpSpPr>
+        <p:cNvPr id="1" name="" hidden="0"/>
+        <p:cNvGrpSpPr/>
+        <p:nvPr isPhoto="0" userDrawn="0"/>
+      </p:nvGrpSpPr>
+      <p:grpSpPr bwMode="auto">
+        <a:xfrm>
+          <a:off x="0" y="0"/>
+          <a:ext cx="0" cy="0"/>
+          <a:chOff x="0" y="0"/>
+          <a:chExt cx="0" cy="0"/>
+        </a:xfrm>
+      </p:grpSpPr>
+      <p:sp>
+        <p:nvSpPr>
+          <p:cNvPr id="4" name="Google Shape;267;p55" hidden="0"/>
+          <p:cNvSpPr/>
+          <p:nvPr isPhoto="0" userDrawn="0"/>
+        </p:nvSpPr>
+        <p:spPr bwMode="auto">
+          <a:xfrm>
+            <a:off x="457200" y="781200"/>
+            <a:ext cx="8228520" cy="618120"/>
+          </a:xfrm>
+          <a:prstGeom prst="rect">
+            <a:avLst/>
+          </a:prstGeom>
+          <a:noFill/>
+          <a:ln>
+            <a:noFill/>
+          </a:ln>
+        </p:spPr>
+        <p:txBody>
+          <a:bodyPr spcFirstLastPara="1" wrap="square" lIns="90000" tIns="45000" rIns="90000" bIns="45000" anchor="t" anchorCtr="0">
+            <a:noAutofit/>
+          </a:bodyPr>
+          <a:lstStyle/>
+          <a:p>
+            <a:pPr marL="0" marR="0" lvl="0" indent="0" algn="l">
+              <a:lnSpc>
+                <a:spcPct val="100000"/>
+              </a:lnSpc>
+              <a:spcBef>
+                <a:spcPts val="0"/>
+              </a:spcBef>
+              <a:spcAft>
+                <a:spcPts val="0"/>
+              </a:spcAft>
+              <a:buNone/>
+              <a:defRPr/>
+            </a:pPr>
+            <a:r>
+              <a:rPr lang="pt-BR" sz="3200" b="0" i="0" u="none" strike="noStrike" cap="none">
+                <a:solidFill>
+                  <a:srgbClr val="C00026"/>
+                </a:solidFill>
+                <a:latin typeface="Verdana"/>
+                <a:ea typeface="Verdana"/>
+                <a:cs typeface="Verdana"/>
+              </a:rPr>
+              <a:t>Fechamento</a:t>
+            </a:r>
+            <a:endParaRPr sz="3200" b="0" i="0" u="none" strike="noStrike" cap="none">
+              <a:solidFill>
+                <a:schemeClr val="dk1"/>
+              </a:solidFill>
+              <a:latin typeface="Arial"/>
+              <a:ea typeface="Arial"/>
+              <a:cs typeface="Arial"/>
+            </a:endParaRPr>
+          </a:p>
+        </p:txBody>
+      </p:sp>
+      <p:sp>
+        <p:nvSpPr>
+          <p:cNvPr id="5" name="Google Shape;268;p55" hidden="0"/>
+          <p:cNvSpPr/>
+          <p:nvPr isPhoto="0" userDrawn="0"/>
+        </p:nvSpPr>
+        <p:spPr bwMode="auto">
+          <a:xfrm>
+            <a:off x="162000" y="85680"/>
+            <a:ext cx="7228440" cy="351360"/>
+          </a:xfrm>
+          <a:prstGeom prst="rect">
+            <a:avLst/>
+          </a:prstGeom>
+          <a:noFill/>
+          <a:ln>
+            <a:noFill/>
+          </a:ln>
+        </p:spPr>
+        <p:txBody>
+          <a:bodyPr spcFirstLastPara="1" wrap="square" lIns="91422" tIns="91422" rIns="91422" bIns="91422" anchor="ctr" anchorCtr="0">
+            <a:noAutofit/>
+          </a:bodyPr>
+          <a:lstStyle/>
+          <a:p>
+            <a:pPr marL="0" lvl="0" indent="0" algn="l">
+              <a:spcBef>
+                <a:spcPts val="0"/>
+              </a:spcBef>
+              <a:spcAft>
+                <a:spcPts val="0"/>
+              </a:spcAft>
+              <a:buNone/>
+              <a:defRPr/>
+            </a:pPr>
+            <a:endParaRPr/>
+          </a:p>
+        </p:txBody>
+      </p:sp>
+      <p:sp>
+        <p:nvSpPr>
+          <p:cNvPr id="6" name="Google Shape;269;p55" hidden="0"/>
+          <p:cNvSpPr/>
+          <p:nvPr isPhoto="0" userDrawn="0"/>
+        </p:nvSpPr>
+        <p:spPr bwMode="auto">
+          <a:xfrm>
+            <a:off x="84240" y="6402240"/>
+            <a:ext cx="640440" cy="363960"/>
+          </a:xfrm>
+          <a:prstGeom prst="rect">
+            <a:avLst/>
+          </a:prstGeom>
+          <a:noFill/>
+          <a:ln>
+            <a:noFill/>
+          </a:ln>
+        </p:spPr>
+        <p:txBody>
+          <a:bodyPr spcFirstLastPara="1" wrap="square" lIns="90000" tIns="45000" rIns="90000" bIns="45000" anchor="ctr" anchorCtr="0">
+            <a:noAutofit/>
+          </a:bodyPr>
+          <a:lstStyle/>
+          <a:p>
+            <a:pPr marL="0" marR="0" lvl="0" indent="0" algn="r">
+              <a:lnSpc>
+                <a:spcPct val="100000"/>
+              </a:lnSpc>
+              <a:spcBef>
+                <a:spcPts val="0"/>
+              </a:spcBef>
+              <a:spcAft>
+                <a:spcPts val="0"/>
+              </a:spcAft>
+              <a:buNone/>
+              <a:defRPr/>
+            </a:pPr>
+            <a:fld id="{60BF2BA5-0B77-A2CC-4AC2-DE428F1741AE}" type="slidenum">
+              <a:rPr lang="pt-BR" sz="1000" b="0" i="0" u="none" strike="noStrike" cap="none">
+                <a:solidFill>
+                  <a:srgbClr val="B2B2B2"/>
+                </a:solidFill>
+                <a:latin typeface="Verdana"/>
+                <a:ea typeface="Verdana"/>
+                <a:cs typeface="Verdana"/>
+              </a:rPr>
+              <a:t/>
+            </a:fld>
+            <a:endParaRPr sz="1000" b="0" i="0" u="none" strike="noStrike" cap="none">
+              <a:solidFill>
+                <a:schemeClr val="dk1"/>
+              </a:solidFill>
+              <a:latin typeface="Arial"/>
+              <a:ea typeface="Arial"/>
+              <a:cs typeface="Arial"/>
+            </a:endParaRPr>
+          </a:p>
+        </p:txBody>
+      </p:sp>
+      <p:sp>
+        <p:nvSpPr>
+          <p:cNvPr id="7" name="Google Shape;270;p55" hidden="0"/>
+          <p:cNvSpPr>
+            <a:spLocks noAdjustHandles="0" noChangeArrowheads="0"/>
+          </p:cNvSpPr>
+          <p:nvPr isPhoto="0" userDrawn="0"/>
+        </p:nvSpPr>
+        <p:spPr bwMode="auto">
+          <a:xfrm flipH="0" flipV="0">
+            <a:off x="309227" y="1588487"/>
+            <a:ext cx="8704381" cy="4976428"/>
+          </a:xfrm>
+          <a:prstGeom prst="rect">
+            <a:avLst/>
+          </a:prstGeom>
+          <a:noFill/>
+          <a:ln>
+            <a:noFill/>
+          </a:ln>
+        </p:spPr>
+        <p:txBody>
+          <a:bodyPr spcFirstLastPara="1" wrap="square" lIns="91422" tIns="45696" rIns="91422" bIns="45696" anchor="t" anchorCtr="0">
+            <a:noAutofit/>
+          </a:bodyPr>
+          <a:lstStyle/>
+          <a:p>
+            <a:pPr algn="l">
+              <a:defRPr/>
+            </a:pPr>
+            <a:endParaRPr sz="2400" b="1" u="sng">
+              <a:solidFill>
+                <a:schemeClr val="accent2"/>
+              </a:solidFill>
+            </a:endParaRPr>
+          </a:p>
+          <a:p>
+            <a:pPr algn="l">
+              <a:defRPr/>
+            </a:pPr>
+            <a:r>
+              <a:rPr sz="2400" b="0" u="none">
+                <a:solidFill>
+                  <a:schemeClr val="tx1"/>
+                </a:solidFill>
+              </a:rPr>
+              <a:t>Depois de escolher um bom algoritmo e ter uma implementação ingênua, </a:t>
+            </a:r>
+            <a:endParaRPr sz="2400" b="0" u="none">
+              <a:solidFill>
+                <a:schemeClr val="tx1"/>
+              </a:solidFill>
+            </a:endParaRPr>
+          </a:p>
+          <a:p>
+            <a:pPr algn="l">
+              <a:defRPr/>
+            </a:pPr>
+            <a:endParaRPr sz="2400" b="0" u="none">
+              <a:solidFill>
+                <a:schemeClr val="tx1"/>
+              </a:solidFill>
+            </a:endParaRPr>
+          </a:p>
+          <a:p>
+            <a:pPr marL="394022" indent="-394022" algn="l">
+              <a:lnSpc>
+                <a:spcPct val="150000"/>
+              </a:lnSpc>
+              <a:buFont typeface="Arial"/>
+              <a:buChar char="•"/>
+              <a:defRPr/>
+            </a:pPr>
+            <a:r>
+              <a:rPr sz="2400" b="0" u="none">
+                <a:solidFill>
+                  <a:schemeClr val="tx1"/>
+                </a:solidFill>
+              </a:rPr>
+              <a:t>Entrada/Saída custa caro. </a:t>
+            </a:r>
+            <a:endParaRPr sz="2400" b="0" u="none">
+              <a:solidFill>
+                <a:schemeClr val="tx1"/>
+              </a:solidFill>
+            </a:endParaRPr>
+          </a:p>
+          <a:p>
+            <a:pPr marL="394022" indent="-394022" algn="l">
+              <a:lnSpc>
+                <a:spcPct val="150000"/>
+              </a:lnSpc>
+              <a:buFont typeface="Arial"/>
+              <a:buChar char="•"/>
+              <a:defRPr/>
+            </a:pPr>
+            <a:r>
+              <a:rPr sz="2400" b="0" u="none">
+                <a:solidFill>
+                  <a:schemeClr val="tx1"/>
+                </a:solidFill>
+              </a:rPr>
+              <a:t>Implementações diferentes do mesmo algoritmo podem ter desempenho diferente</a:t>
+            </a:r>
+            <a:endParaRPr sz="2400" b="0" u="none">
+              <a:solidFill>
+                <a:schemeClr val="tx1"/>
+              </a:solidFill>
+            </a:endParaRPr>
+          </a:p>
+          <a:p>
+            <a:pPr marL="394022" indent="-394022" algn="l">
+              <a:lnSpc>
+                <a:spcPct val="150000"/>
+              </a:lnSpc>
+              <a:buFont typeface="Arial"/>
+              <a:buChar char="•"/>
+              <a:defRPr/>
+            </a:pPr>
+            <a:r>
+              <a:rPr sz="2400" b="0" u="none">
+                <a:solidFill>
+                  <a:schemeClr val="tx1"/>
+                </a:solidFill>
+              </a:rPr>
+              <a:t>Medimos esses ganhos com ferramentas de profiling. </a:t>
+            </a:r>
+            <a:endParaRPr sz="2400" b="0" u="none">
+              <a:solidFill>
+                <a:schemeClr val="tx1"/>
+              </a:solidFill>
+            </a:endParaRPr>
+          </a:p>
+          <a:p>
+            <a:pPr marL="394022" indent="-394022" algn="l">
+              <a:buFont typeface="Arial"/>
+              <a:buChar char="•"/>
+              <a:defRPr/>
+            </a:pPr>
+            <a:endParaRPr sz="2800" b="0" u="none">
+              <a:solidFill>
+                <a:schemeClr val="tx1"/>
+              </a:solidFill>
+            </a:endParaRPr>
+          </a:p>
+        </p:txBody>
+      </p:sp>
+    </p:spTree>
+  </p:cSld>
+  <p:clrMapOvr>
+    <a:masterClrMapping/>
+  </p:clrMapOvr>
+  <mc:AlternateContent xmlns:mc="http://schemas.openxmlformats.org/markup-compatibility/2006">
+    <mc:Choice xmlns:p14="http://schemas.microsoft.com/office/powerpoint/2010/main" Requires="p14">
+      <p:transition p14:dur="2000" advClick="1"/>
+    </mc:Choice>
+    <mc:Fallback>
+      <p:transition advClick="1"/>
+    </mc:Fallback>
+  </mc:AlternateContent>
+</p:sld>
+</file>
+
+<file path=ppt/slides/slide16.xml><?xml version="1.0" encoding="utf-8"?>
 <p:sld xmlns:a="http://schemas.openxmlformats.org/drawingml/2006/main" xmlns:r="http://schemas.openxmlformats.org/officeDocument/2006/relationships" xmlns:p="http://schemas.openxmlformats.org/presentationml/2006/main" xmlns:m="http://schemas.openxmlformats.org/officeDocument/2006/math" xmlns:w="http://schemas.openxmlformats.org/wordprocessingml/2006/main" showMasterPhAnim="0" show="1">
   <p:cSld name="">
     <p:bg>
@@ -14404,44 +15533,6 @@
           </a:p>
         </p:txBody>
       </p:sp>
-      <p:sp>
-        <p:nvSpPr>
-          <p:cNvPr id="7" name="Google Shape;270;p55" hidden="0"/>
-          <p:cNvSpPr>
-            <a:spLocks noAdjustHandles="0" noChangeArrowheads="0"/>
-          </p:cNvSpPr>
-          <p:nvPr isPhoto="0" userDrawn="0"/>
-        </p:nvSpPr>
-        <p:spPr bwMode="auto">
-          <a:xfrm flipH="0" flipV="0">
-            <a:off x="309228" y="2760796"/>
-            <a:ext cx="8704382" cy="4976430"/>
-          </a:xfrm>
-          <a:prstGeom prst="rect">
-            <a:avLst/>
-          </a:prstGeom>
-          <a:noFill/>
-          <a:ln>
-            <a:noFill/>
-          </a:ln>
-        </p:spPr>
-        <p:txBody>
-          <a:bodyPr spcFirstLastPara="1" wrap="square" lIns="91422" tIns="45697" rIns="91422" bIns="45697" anchor="t" anchorCtr="0">
-            <a:noAutofit/>
-          </a:bodyPr>
-          <a:lstStyle/>
-          <a:p>
-            <a:pPr algn="ctr">
-              <a:defRPr/>
-            </a:pPr>
-            <a:r>
-              <a:rPr sz="3600"/>
-              <a:t>"Sequência finita de passos executáveis que resolve um problema"</a:t>
-            </a:r>
-            <a:endParaRPr sz="2400"/>
-          </a:p>
-        </p:txBody>
-      </p:sp>
     </p:spTree>
   </p:cSld>
   <p:clrMapOvr>
@@ -14449,10 +15540,10 @@
   </p:clrMapOvr>
   <mc:AlternateContent xmlns:mc="http://schemas.openxmlformats.org/markup-compatibility/2006">
     <mc:Choice xmlns:p14="http://schemas.microsoft.com/office/powerpoint/2010/main" Requires="p14">
-      <p:transition p14:dur="2000" advClick="1"/>
+      <p:transition p14:dur="2000" advClick="0"/>
     </mc:Choice>
     <mc:Fallback>
-      <p:transition advClick="1"/>
+      <p:transition advClick="0"/>
     </mc:Fallback>
   </mc:AlternateContent>
 </p:sld>
@@ -14522,7 +15613,7 @@
                 <a:ea typeface="Verdana"/>
                 <a:cs typeface="Verdana"/>
               </a:rPr>
-              <a:t>Implementação</a:t>
+              <a:t>Algoritmo</a:t>
             </a:r>
             <a:endParaRPr sz="3200" b="0" i="0" u="none" strike="noStrike" cap="none">
               <a:solidFill>
@@ -14612,7 +15703,7 @@
               <a:buNone/>
               <a:defRPr/>
             </a:pPr>
-            <a:fld id="{6D67924C-3281-E486-2725-A20962E22B74}" type="slidenum">
+            <a:fld id="{196686F4-68E3-0F17-3CBE-5FCD6B17E46E}" type="slidenum">
               <a:rPr lang="pt-BR" sz="1000" b="0" i="0" u="none" strike="noStrike" cap="none">
                 <a:solidFill>
                   <a:srgbClr val="B2B2B2"/>
@@ -14644,8 +15735,8 @@
         </p:nvSpPr>
         <p:spPr bwMode="auto">
           <a:xfrm flipH="0" flipV="0">
-            <a:off x="309228" y="2760796"/>
-            <a:ext cx="8704383" cy="4976431"/>
+            <a:off x="309227" y="2760795"/>
+            <a:ext cx="8704381" cy="4976428"/>
           </a:xfrm>
           <a:prstGeom prst="rect">
             <a:avLst/>
@@ -14656,7 +15747,7 @@
           </a:ln>
         </p:spPr>
         <p:txBody>
-          <a:bodyPr spcFirstLastPara="1" wrap="square" lIns="91422" tIns="45698" rIns="91422" bIns="45698" anchor="t" anchorCtr="0">
+          <a:bodyPr spcFirstLastPara="1" wrap="square" lIns="91422" tIns="45696" rIns="91422" bIns="45696" anchor="t" anchorCtr="0">
             <a:noAutofit/>
           </a:bodyPr>
           <a:lstStyle/>
@@ -14666,7 +15757,7 @@
             </a:pPr>
             <a:r>
               <a:rPr sz="3600"/>
-              <a:t>"Transformação de um algoritmo em um programa executável"</a:t>
+              <a:t>"Sequência finita de passos executáveis que resolve um problema"</a:t>
             </a:r>
             <a:endParaRPr sz="2400"/>
           </a:p>
@@ -14679,10 +15770,10 @@
   </p:clrMapOvr>
   <mc:AlternateContent xmlns:mc="http://schemas.openxmlformats.org/markup-compatibility/2006">
     <mc:Choice xmlns:p14="http://schemas.microsoft.com/office/powerpoint/2010/main" Requires="p14">
-      <p:transition p14:dur="2000" advClick="1"/>
+      <p:transition p14:dur="2000" advClick="0"/>
     </mc:Choice>
     <mc:Fallback>
-      <p:transition advClick="1"/>
+      <p:transition advClick="0"/>
     </mc:Fallback>
   </mc:AlternateContent>
 </p:sld>
@@ -14752,7 +15843,7 @@
                 <a:ea typeface="Verdana"/>
                 <a:cs typeface="Verdana"/>
               </a:rPr>
-              <a:t>Quanto tempo um programa demora?</a:t>
+              <a:t>Implementação</a:t>
             </a:r>
             <a:endParaRPr sz="3200" b="0" i="0" u="none" strike="noStrike" cap="none">
               <a:solidFill>
@@ -14842,7 +15933,7 @@
               <a:buNone/>
               <a:defRPr/>
             </a:pPr>
-            <a:fld id="{472005A8-417F-10C5-FB9D-623633D58EB4}" type="slidenum">
+            <a:fld id="{6D67924C-3281-E486-2725-A20962E22B74}" type="slidenum">
               <a:rPr lang="pt-BR" sz="1000" b="0" i="0" u="none" strike="noStrike" cap="none">
                 <a:solidFill>
                   <a:srgbClr val="B2B2B2"/>
@@ -14861,204 +15952,6 @@
               <a:ea typeface="Arial"/>
               <a:cs typeface="Arial"/>
             </a:endParaRPr>
-          </a:p>
-        </p:txBody>
-      </p:sp>
-      <p:sp>
-        <p:nvSpPr>
-          <p:cNvPr id="7" name="Google Shape;270;p55" hidden="0"/>
-          <p:cNvSpPr>
-            <a:spLocks noAdjustHandles="0" noChangeArrowheads="0"/>
-          </p:cNvSpPr>
-          <p:nvPr isPhoto="0" userDrawn="0"/>
-        </p:nvSpPr>
-        <p:spPr bwMode="auto">
-          <a:xfrm flipH="0" flipV="0">
-            <a:off x="309228" y="1588488"/>
-            <a:ext cx="8704382" cy="4976430"/>
-          </a:xfrm>
-          <a:prstGeom prst="rect">
-            <a:avLst/>
-          </a:prstGeom>
-          <a:noFill/>
-          <a:ln>
-            <a:noFill/>
-          </a:ln>
-        </p:spPr>
-        <p:txBody>
-          <a:bodyPr spcFirstLastPara="1" wrap="square" lIns="91422" tIns="45697" rIns="91422" bIns="45697" anchor="t" anchorCtr="0">
-            <a:noAutofit/>
-          </a:bodyPr>
-          <a:lstStyle/>
-          <a:p>
-            <a:pPr algn="l">
-              <a:defRPr/>
-            </a:pPr>
-            <a:endParaRPr sz="2400" b="1" u="sng">
-              <a:solidFill>
-                <a:schemeClr val="accent2"/>
-              </a:solidFill>
-            </a:endParaRPr>
-          </a:p>
-          <a:p>
-            <a:pPr algn="l">
-              <a:defRPr/>
-            </a:pPr>
-            <a:r>
-              <a:rPr sz="2800" b="1" u="sng">
-                <a:solidFill>
-                  <a:schemeClr val="accent2"/>
-                </a:solidFill>
-              </a:rPr>
-              <a:t>Algoritmo</a:t>
-            </a:r>
-            <a:r>
-              <a:rPr sz="2800" u="sng">
-                <a:solidFill>
-                  <a:schemeClr val="accent2"/>
-                </a:solidFill>
-              </a:rPr>
-              <a:t>: </a:t>
-            </a:r>
-            <a:endParaRPr sz="2400" u="sng">
-              <a:solidFill>
-                <a:schemeClr val="accent2"/>
-              </a:solidFill>
-            </a:endParaRPr>
-          </a:p>
-          <a:p>
-            <a:pPr marL="349965" indent="-349965" algn="l">
-              <a:buFont typeface="Arial"/>
-              <a:buChar char="•"/>
-              <a:defRPr/>
-            </a:pPr>
-            <a:r>
-              <a:rPr sz="2400" u="none"/>
-              <a:t>complexidade</a:t>
-            </a:r>
-            <a:r>
-              <a:rPr sz="2400" u="none"/>
-              <a:t> c</a:t>
-            </a:r>
-            <a:r>
-              <a:rPr sz="2400" u="none"/>
-              <a:t>omputacional (classes de algoritmos)</a:t>
-            </a:r>
-            <a:endParaRPr sz="2400" u="none"/>
-          </a:p>
-          <a:p>
-            <a:pPr marL="349965" indent="-349965" algn="l">
-              <a:buFont typeface="Arial"/>
-              <a:buChar char="•"/>
-              <a:defRPr/>
-            </a:pPr>
-            <a:r>
-              <a:rPr sz="2400" u="none"/>
-              <a:t>estrutur</a:t>
-            </a:r>
-            <a:r>
-              <a:rPr sz="2400" u="none"/>
-              <a:t>as de</a:t>
-            </a:r>
-            <a:r>
-              <a:rPr sz="2400" u="none"/>
-              <a:t> dados (abstratas)</a:t>
-            </a:r>
-            <a:endParaRPr sz="2400" u="none"/>
-          </a:p>
-          <a:p>
-            <a:pPr marL="349965" indent="-349965" algn="l">
-              <a:buFont typeface="Arial"/>
-              <a:buChar char="•"/>
-              <a:defRPr/>
-            </a:pPr>
-            <a:endParaRPr sz="2400" u="none"/>
-          </a:p>
-          <a:p>
-            <a:pPr marL="349965" indent="-349965" algn="l">
-              <a:buFont typeface="Arial"/>
-              <a:buChar char="•"/>
-              <a:defRPr/>
-            </a:pPr>
-            <a:endParaRPr sz="2400" u="none"/>
-          </a:p>
-          <a:p>
-            <a:pPr algn="l">
-              <a:defRPr/>
-            </a:pPr>
-            <a:r>
-              <a:rPr sz="2800" b="1" u="sng">
-                <a:solidFill>
-                  <a:schemeClr val="accent2"/>
-                </a:solidFill>
-              </a:rPr>
-              <a:t>Implementação:</a:t>
-            </a:r>
-            <a:r>
-              <a:rPr sz="2400" u="sng"/>
-              <a:t> </a:t>
-            </a:r>
-            <a:endParaRPr sz="2400" u="sng"/>
-          </a:p>
-          <a:p>
-            <a:pPr marL="349965" indent="-349965" algn="l">
-              <a:buFont typeface="Arial"/>
-              <a:buChar char="•"/>
-              <a:defRPr/>
-            </a:pPr>
-            <a:r>
-              <a:rPr sz="2400" u="none"/>
-              <a:t>medido em segundos, para uma certa entrada</a:t>
-            </a:r>
-            <a:endParaRPr sz="2400" u="none"/>
-          </a:p>
-          <a:p>
-            <a:pPr marL="349965" indent="-349965" algn="l">
-              <a:buFont typeface="Arial"/>
-              <a:buChar char="•"/>
-              <a:defRPr/>
-            </a:pPr>
-            <a:r>
-              <a:rPr sz="2400" u="none"/>
-              <a:t>tecnologia usadas (linguagens de programação, bibliotecas)</a:t>
-            </a:r>
-            <a:endParaRPr sz="2400" u="none"/>
-          </a:p>
-          <a:p>
-            <a:pPr marL="349965" indent="-349965" algn="l">
-              <a:buFont typeface="Arial"/>
-              <a:buChar char="•"/>
-              <a:defRPr/>
-            </a:pPr>
-            <a:r>
-              <a:rPr sz="2400" u="none"/>
-              <a:t>hardware usado</a:t>
-            </a:r>
-            <a:endParaRPr sz="2400" u="none"/>
-          </a:p>
-          <a:p>
-            <a:pPr marL="750015" lvl="1" indent="-349965" algn="l">
-              <a:buFont typeface="Arial"/>
-              <a:buChar char="•"/>
-              <a:defRPr/>
-            </a:pPr>
-            <a:r>
-              <a:rPr sz="2400" u="none"/>
-              <a:t>Clock de CPU e RAM, tamanho do Cache</a:t>
-            </a:r>
-            <a:endParaRPr sz="2400" u="none"/>
-          </a:p>
-          <a:p>
-            <a:pPr marL="750015" lvl="1" indent="-349965" algn="l">
-              <a:buFont typeface="Arial"/>
-              <a:buChar char="•"/>
-              <a:defRPr/>
-            </a:pPr>
-            <a:r>
-              <a:rPr sz="2400" u="none"/>
-              <a:t># de núcleos </a:t>
-            </a:r>
-            <a:endParaRPr sz="2400" u="none"/>
           </a:p>
         </p:txBody>
       </p:sp>
@@ -15142,7 +16035,7 @@
                 <a:ea typeface="Verdana"/>
                 <a:cs typeface="Verdana"/>
               </a:rPr>
-              <a:t>Quanto tempo um programa demora?</a:t>
+              <a:t>Implementação</a:t>
             </a:r>
             <a:endParaRPr sz="3200" b="0" i="0" u="none" strike="noStrike" cap="none">
               <a:solidFill>
@@ -15232,7 +16125,7 @@
               <a:buNone/>
               <a:defRPr/>
             </a:pPr>
-            <a:fld id="{FDEA0AB0-E1A8-E38C-6A6B-B695DC5A22E4}" type="slidenum">
+            <a:fld id="{A4372481-A4AC-47FF-C342-480B16AD4DD9}" type="slidenum">
               <a:rPr lang="pt-BR" sz="1000" b="0" i="0" u="none" strike="noStrike" cap="none">
                 <a:solidFill>
                   <a:srgbClr val="B2B2B2"/>
@@ -15264,7 +16157,7 @@
         </p:nvSpPr>
         <p:spPr bwMode="auto">
           <a:xfrm flipH="0" flipV="0">
-            <a:off x="309228" y="1588488"/>
+            <a:off x="309227" y="2760795"/>
             <a:ext cx="8704382" cy="4976430"/>
           </a:xfrm>
           <a:prstGeom prst="rect">
@@ -15281,32 +16174,14 @@
           </a:bodyPr>
           <a:lstStyle/>
           <a:p>
-            <a:pPr algn="l">
-              <a:defRPr/>
-            </a:pPr>
-            <a:endParaRPr sz="2400" b="1" u="sng">
-              <a:solidFill>
-                <a:schemeClr val="accent2"/>
-              </a:solidFill>
-            </a:endParaRPr>
-          </a:p>
-          <a:p>
-            <a:pPr algn="l">
+            <a:pPr algn="ctr">
               <a:defRPr/>
             </a:pPr>
             <a:r>
-              <a:rPr sz="2400" b="1" u="sng">
-                <a:solidFill>
-                  <a:schemeClr val="accent2"/>
-                </a:solidFill>
-              </a:rPr>
-              <a:t>das</a:t>
+              <a:rPr sz="3600"/>
+              <a:t>"Transformação de um algoritmo em um programa executável"</a:t>
             </a:r>
-            <a:endParaRPr sz="2400" b="1" u="sng">
-              <a:solidFill>
-                <a:schemeClr val="accent2"/>
-              </a:solidFill>
-            </a:endParaRPr>
+            <a:endParaRPr sz="2400"/>
           </a:p>
         </p:txBody>
       </p:sp>
@@ -15345,13 +16220,13 @@
       </p:grpSpPr>
       <p:sp>
         <p:nvSpPr>
-          <p:cNvPr id="4" name="Google Shape;347;p64" hidden="0"/>
+          <p:cNvPr id="4" name="Google Shape;267;p55" hidden="0"/>
           <p:cNvSpPr/>
           <p:nvPr isPhoto="0" userDrawn="0"/>
         </p:nvSpPr>
         <p:spPr bwMode="auto">
           <a:xfrm>
-            <a:off x="457200" y="2920660"/>
+            <a:off x="457200" y="781200"/>
             <a:ext cx="8228520" cy="618120"/>
           </a:xfrm>
           <a:prstGeom prst="rect">
@@ -15368,7 +16243,7 @@
           </a:bodyPr>
           <a:lstStyle/>
           <a:p>
-            <a:pPr marL="0" marR="0" lvl="0" indent="0" algn="ctr">
+            <a:pPr marL="0" marR="0" lvl="0" indent="0" algn="l">
               <a:lnSpc>
                 <a:spcPct val="100000"/>
               </a:lnSpc>
@@ -15382,7 +16257,7 @@
               <a:defRPr/>
             </a:pPr>
             <a:r>
-              <a:rPr lang="pt-BR" sz="3600" b="1" i="0" u="none" strike="noStrike" cap="none">
+              <a:rPr lang="pt-BR" sz="3200" b="0" i="0" u="none" strike="noStrike" cap="none">
                 <a:solidFill>
                   <a:srgbClr val="C00026"/>
                 </a:solidFill>
@@ -15390,9 +16265,9 @@
                 <a:ea typeface="Verdana"/>
                 <a:cs typeface="Verdana"/>
               </a:rPr>
-              <a:t>Atividade prática</a:t>
+              <a:t>Quanto tempo um programa demora?</a:t>
             </a:r>
-            <a:endParaRPr sz="3600" b="1" i="0" u="none" strike="noStrike" cap="none">
+            <a:endParaRPr sz="3200" b="0" i="0" u="none" strike="noStrike" cap="none">
               <a:solidFill>
                 <a:schemeClr val="dk1"/>
               </a:solidFill>
@@ -15405,7 +16280,7 @@
       </p:sp>
       <p:sp>
         <p:nvSpPr>
-          <p:cNvPr id="5" name="Google Shape;348;p64" hidden="0"/>
+          <p:cNvPr id="5" name="Google Shape;268;p55" hidden="0"/>
           <p:cNvSpPr/>
           <p:nvPr isPhoto="0" userDrawn="0"/>
         </p:nvSpPr>
@@ -15444,7 +16319,7 @@
       </p:sp>
       <p:sp>
         <p:nvSpPr>
-          <p:cNvPr id="6" name="Google Shape;349;p64" hidden="0"/>
+          <p:cNvPr id="6" name="Google Shape;269;p55" hidden="0"/>
           <p:cNvSpPr/>
           <p:nvPr isPhoto="0" userDrawn="0"/>
         </p:nvSpPr>
@@ -15480,7 +16355,7 @@
               <a:buNone/>
               <a:defRPr/>
             </a:pPr>
-            <a:fld id="{6BD212D0-B152-A436-4E68-37FA9749967B}" type="slidenum">
+            <a:fld id="{472005A8-417F-10C5-FB9D-623633D58EB4}" type="slidenum">
               <a:rPr lang="pt-BR" sz="1000" b="0" i="0" u="none" strike="noStrike" cap="none">
                 <a:solidFill>
                   <a:srgbClr val="B2B2B2"/>
@@ -15504,61 +16379,215 @@
       </p:sp>
       <p:sp>
         <p:nvSpPr>
-          <p:cNvPr id="7" name="" hidden="0"/>
-          <p:cNvSpPr/>
+          <p:cNvPr id="7" name="Google Shape;270;p55" hidden="0"/>
+          <p:cNvSpPr>
+            <a:spLocks noAdjustHandles="0" noChangeArrowheads="0"/>
+          </p:cNvSpPr>
           <p:nvPr isPhoto="0" userDrawn="0"/>
         </p:nvSpPr>
         <p:spPr bwMode="auto">
           <a:xfrm flipH="0" flipV="0">
-            <a:off x="724679" y="4088422"/>
-            <a:ext cx="5712037" cy="363451"/>
+            <a:off x="309228" y="1588488"/>
+            <a:ext cx="8704382" cy="4976429"/>
           </a:xfrm>
           <a:prstGeom prst="rect">
             <a:avLst/>
           </a:prstGeom>
           <a:noFill/>
+          <a:ln>
+            <a:noFill/>
+          </a:ln>
         </p:spPr>
         <p:txBody>
-          <a:bodyPr vertOverflow="overflow" horzOverflow="clip" vert="horz" wrap="square" lIns="91440" tIns="45720" rIns="91440" bIns="45720" numCol="1" spcCol="0" rtlCol="0" fromWordArt="0" anchor="t" anchorCtr="0" forceAA="0" upright="0" compatLnSpc="0">
+          <a:bodyPr spcFirstLastPara="1" wrap="square" lIns="91422" tIns="45697" rIns="91422" bIns="45697" anchor="t" anchorCtr="0">
             <a:noAutofit/>
           </a:bodyPr>
-          <a:p>
-            <a:pPr>
+          <a:lstStyle/>
+          <a:p>
+            <a:pPr algn="l">
+              <a:defRPr/>
+            </a:pPr>
+            <a:endParaRPr sz="2400" b="1" u="sng">
+              <a:solidFill>
+                <a:schemeClr val="accent2"/>
+              </a:solidFill>
+            </a:endParaRPr>
+          </a:p>
+          <a:p>
+            <a:pPr algn="l">
               <a:defRPr/>
             </a:pPr>
             <a:r>
-              <a:rPr sz="2000" b="1"/>
-              <a:t>Detalhes de implementação</a:t>
+              <a:rPr sz="2800" b="1" u="sng">
+                <a:solidFill>
+                  <a:schemeClr val="accent2"/>
+                </a:solidFill>
+              </a:rPr>
+              <a:t>Algoritmo</a:t>
             </a:r>
-            <a:endParaRPr sz="2000" b="1"/>
-          </a:p>
-          <a:p>
-            <a:pPr>
-              <a:defRPr/>
-            </a:pPr>
-            <a:endParaRPr sz="2000"/>
-          </a:p>
-          <a:p>
-            <a:pPr marL="305908" indent="-305908">
-              <a:buAutoNum type="arabicPeriod"/>
-              <a:defRPr/>
-            </a:pPr>
             <a:r>
-              <a:rPr sz="2000" b="0"/>
-              <a:t>Organização de dados na memória (matrizes)</a:t>
+              <a:rPr sz="2800" u="sng">
+                <a:solidFill>
+                  <a:schemeClr val="accent2"/>
+                </a:solidFill>
+              </a:rPr>
+              <a:t>: </a:t>
             </a:r>
-            <a:endParaRPr sz="2000" b="0"/>
-          </a:p>
-          <a:p>
-            <a:pPr marL="305908" indent="-305908">
-              <a:buAutoNum type="arabicPeriod"/>
+            <a:endParaRPr sz="2400" u="sng">
+              <a:solidFill>
+                <a:schemeClr val="accent2"/>
+              </a:solidFill>
+            </a:endParaRPr>
+          </a:p>
+          <a:p>
+            <a:pPr marL="349965" indent="-349965" algn="l">
+              <a:buFont typeface="Arial"/>
+              <a:buChar char="•"/>
               <a:defRPr/>
             </a:pPr>
             <a:r>
-              <a:rPr sz="2000" b="0"/>
-              <a:t>Cópia vs Referência</a:t>
+              <a:rPr sz="2400" u="none"/>
+              <a:t>complexidade</a:t>
             </a:r>
-            <a:endParaRPr sz="2000" b="0"/>
+            <a:r>
+              <a:rPr sz="2400" u="none"/>
+              <a:t> c</a:t>
+            </a:r>
+            <a:r>
+              <a:rPr sz="2400" u="none"/>
+              <a:t>omputacional (classes de algoritmos)</a:t>
+            </a:r>
+            <a:endParaRPr sz="2400" u="none"/>
+          </a:p>
+          <a:p>
+            <a:pPr marL="349965" indent="-349965" algn="l">
+              <a:buFont typeface="Arial"/>
+              <a:buChar char="•"/>
+              <a:defRPr/>
+            </a:pPr>
+            <a:r>
+              <a:rPr sz="2400" u="none"/>
+              <a:t>estrutur</a:t>
+            </a:r>
+            <a:r>
+              <a:rPr sz="2400" u="none"/>
+              <a:t>as de</a:t>
+            </a:r>
+            <a:r>
+              <a:rPr sz="2400" u="none"/>
+              <a:t> dados (abstratas)</a:t>
+            </a:r>
+            <a:endParaRPr sz="2400" u="none"/>
+          </a:p>
+          <a:p>
+            <a:pPr marL="349965" indent="-349965" algn="l">
+              <a:buFont typeface="Arial"/>
+              <a:buChar char="•"/>
+              <a:defRPr/>
+            </a:pPr>
+            <a:r>
+              <a:rPr sz="2400" b="1" u="none"/>
+              <a:t>provado matematicamente, não muda</a:t>
+            </a:r>
+            <a:endParaRPr sz="2400" u="none"/>
+          </a:p>
+          <a:p>
+            <a:pPr marL="349965" indent="-349965" algn="l">
+              <a:buFont typeface="Arial"/>
+              <a:buChar char="•"/>
+              <a:defRPr/>
+            </a:pPr>
+            <a:endParaRPr sz="2400" u="none"/>
+          </a:p>
+          <a:p>
+            <a:pPr algn="l">
+              <a:defRPr/>
+            </a:pPr>
+            <a:r>
+              <a:rPr sz="2800" b="1" u="sng">
+                <a:solidFill>
+                  <a:schemeClr val="accent2"/>
+                </a:solidFill>
+              </a:rPr>
+              <a:t>Implementação:</a:t>
+            </a:r>
+            <a:r>
+              <a:rPr sz="2400" u="sng"/>
+              <a:t> </a:t>
+            </a:r>
+            <a:endParaRPr sz="2400" u="sng"/>
+          </a:p>
+          <a:p>
+            <a:pPr marL="349965" indent="-349965" algn="l">
+              <a:buFont typeface="Arial"/>
+              <a:buChar char="•"/>
+              <a:defRPr/>
+            </a:pPr>
+            <a:r>
+              <a:rPr sz="2400" u="none"/>
+              <a:t>medido em segundos, para uma certa entrada</a:t>
+            </a:r>
+            <a:endParaRPr sz="2400" u="none"/>
+          </a:p>
+          <a:p>
+            <a:pPr marL="349965" indent="-349965" algn="l">
+              <a:buFont typeface="Arial"/>
+              <a:buChar char="•"/>
+              <a:defRPr/>
+            </a:pPr>
+            <a:r>
+              <a:rPr sz="2400" u="none"/>
+              <a:t>tecnologia usadas (linguagens de programação, bibliotecas)</a:t>
+            </a:r>
+            <a:endParaRPr sz="2400" u="none"/>
+          </a:p>
+          <a:p>
+            <a:pPr marL="349965" indent="-349965" algn="l">
+              <a:buFont typeface="Arial"/>
+              <a:buChar char="•"/>
+              <a:defRPr/>
+            </a:pPr>
+            <a:r>
+              <a:rPr sz="2400" u="none"/>
+              <a:t>hardware usado</a:t>
+            </a:r>
+            <a:endParaRPr sz="2400" u="none"/>
+          </a:p>
+          <a:p>
+            <a:pPr marL="750015" lvl="1" indent="-349965" algn="l">
+              <a:buFont typeface="Arial"/>
+              <a:buChar char="•"/>
+              <a:defRPr/>
+            </a:pPr>
+            <a:r>
+              <a:rPr sz="2400" u="none"/>
+              <a:t>Clock de CPU e RAM, tamanho do Cache</a:t>
+            </a:r>
+            <a:endParaRPr sz="2400" u="none"/>
+          </a:p>
+          <a:p>
+            <a:pPr marL="750015" lvl="1" indent="-349965" algn="l">
+              <a:buFont typeface="Arial"/>
+              <a:buChar char="•"/>
+              <a:defRPr/>
+            </a:pPr>
+            <a:r>
+              <a:rPr sz="2400" u="none"/>
+              <a:t># de núcleos</a:t>
+            </a:r>
+            <a:endParaRPr sz="2400" u="none"/>
+          </a:p>
+          <a:p>
+            <a:pPr marL="349964" lvl="0" indent="-349965" algn="l">
+              <a:buFont typeface="Arial"/>
+              <a:buChar char="•"/>
+              <a:defRPr/>
+            </a:pPr>
+            <a:r>
+              <a:rPr sz="2400" b="1" u="none"/>
+              <a:t>imprecisão</a:t>
+            </a:r>
+            <a:endParaRPr sz="2400" u="none"/>
           </a:p>
         </p:txBody>
       </p:sp>
@@ -15597,14 +16626,14 @@
       </p:grpSpPr>
       <p:sp>
         <p:nvSpPr>
-          <p:cNvPr id="4" name="Google Shape;323;p61" hidden="0"/>
+          <p:cNvPr id="4" name="Google Shape;267;p55" hidden="0"/>
           <p:cNvSpPr/>
           <p:nvPr isPhoto="0" userDrawn="0"/>
         </p:nvSpPr>
         <p:spPr bwMode="auto">
           <a:xfrm>
             <a:off x="457200" y="781200"/>
-            <a:ext cx="8228399" cy="617999"/>
+            <a:ext cx="8228520" cy="618120"/>
           </a:xfrm>
           <a:prstGeom prst="rect">
             <a:avLst/>
@@ -15642,7 +16671,7 @@
                 <a:ea typeface="Verdana"/>
                 <a:cs typeface="Verdana"/>
               </a:rPr>
-              <a:t>Gabaritos e respostas</a:t>
+              <a:t>Quanto tempo um programa demora?</a:t>
             </a:r>
             <a:endParaRPr sz="3200" b="0" i="0" u="none" strike="noStrike" cap="none">
               <a:solidFill>
@@ -15657,14 +16686,14 @@
       </p:sp>
       <p:sp>
         <p:nvSpPr>
-          <p:cNvPr id="5" name="Google Shape;324;p61" hidden="0"/>
+          <p:cNvPr id="5" name="Google Shape;268;p55" hidden="0"/>
           <p:cNvSpPr/>
           <p:nvPr isPhoto="0" userDrawn="0"/>
         </p:nvSpPr>
         <p:spPr bwMode="auto">
           <a:xfrm>
             <a:off x="162000" y="85680"/>
-            <a:ext cx="7228499" cy="351299"/>
+            <a:ext cx="7228440" cy="351360"/>
           </a:xfrm>
           <a:prstGeom prst="rect">
             <a:avLst/>
@@ -15675,7 +16704,7 @@
           </a:ln>
         </p:spPr>
         <p:txBody>
-          <a:bodyPr spcFirstLastPara="1" wrap="square" lIns="91423" tIns="91423" rIns="91423" bIns="91423" anchor="ctr" anchorCtr="0">
+          <a:bodyPr spcFirstLastPara="1" wrap="square" lIns="91422" tIns="91422" rIns="91422" bIns="91422" anchor="ctr" anchorCtr="0">
             <a:noAutofit/>
           </a:bodyPr>
           <a:lstStyle/>
@@ -15696,14 +16725,14 @@
       </p:sp>
       <p:sp>
         <p:nvSpPr>
-          <p:cNvPr id="6" name="Google Shape;325;p61" hidden="0"/>
+          <p:cNvPr id="6" name="Google Shape;269;p55" hidden="0"/>
           <p:cNvSpPr/>
           <p:nvPr isPhoto="0" userDrawn="0"/>
         </p:nvSpPr>
         <p:spPr bwMode="auto">
           <a:xfrm>
             <a:off x="84240" y="6402240"/>
-            <a:ext cx="640499" cy="363898"/>
+            <a:ext cx="640440" cy="363960"/>
           </a:xfrm>
           <a:prstGeom prst="rect">
             <a:avLst/>
@@ -15732,7 +16761,7 @@
               <a:buNone/>
               <a:defRPr/>
             </a:pPr>
-            <a:fld id="{6E1E313B-A7C6-969B-3B0C-BA6ACA7D4AE7}" type="slidenum">
+            <a:fld id="{FDEA0AB0-E1A8-E38C-6A6B-B695DC5A22E4}" type="slidenum">
               <a:rPr lang="pt-BR" sz="1000" b="0" i="0" u="none" strike="noStrike" cap="none">
                 <a:solidFill>
                   <a:srgbClr val="B2B2B2"/>
@@ -15756,16 +16785,16 @@
       </p:sp>
       <p:sp>
         <p:nvSpPr>
-          <p:cNvPr id="7" name="Google Shape;326;p61" hidden="0"/>
+          <p:cNvPr id="7" name="Google Shape;270;p55" hidden="0"/>
           <p:cNvSpPr>
             <a:spLocks noAdjustHandles="0" noChangeArrowheads="0"/>
           </p:cNvSpPr>
           <p:nvPr isPhoto="0" userDrawn="0"/>
         </p:nvSpPr>
         <p:spPr bwMode="auto">
-          <a:xfrm>
-            <a:off x="576000" y="1728000"/>
-            <a:ext cx="8228399" cy="4443300"/>
+          <a:xfrm flipH="0" flipV="0">
+            <a:off x="309228" y="1588488"/>
+            <a:ext cx="8704382" cy="4976429"/>
           </a:xfrm>
           <a:prstGeom prst="rect">
             <a:avLst/>
@@ -15776,285 +16805,150 @@
           </a:ln>
         </p:spPr>
         <p:txBody>
-          <a:bodyPr spcFirstLastPara="1" wrap="square" lIns="90000" tIns="45000" rIns="90000" bIns="45000" anchor="t" anchorCtr="0">
+          <a:bodyPr spcFirstLastPara="1" wrap="square" lIns="91422" tIns="45697" rIns="91422" bIns="45697" anchor="t" anchorCtr="0">
             <a:noAutofit/>
           </a:bodyPr>
           <a:lstStyle/>
           <a:p>
-            <a:pPr lvl="0" algn="l">
-              <a:lnSpc>
-                <a:spcPct val="150000"/>
-              </a:lnSpc>
-              <a:spcBef>
-                <a:spcPts val="0"/>
-              </a:spcBef>
-              <a:spcAft>
-                <a:spcPts val="0"/>
-              </a:spcAft>
+            <a:pPr algn="l">
+              <a:defRPr/>
+            </a:pPr>
+            <a:endParaRPr sz="2400" b="1" u="sng">
+              <a:solidFill>
+                <a:schemeClr val="accent2"/>
+              </a:solidFill>
+            </a:endParaRPr>
+          </a:p>
+          <a:p>
+            <a:pPr algn="l">
+              <a:defRPr/>
+            </a:pPr>
+            <a:endParaRPr sz="2400" b="1" u="sng">
+              <a:solidFill>
+                <a:schemeClr val="accent2"/>
+              </a:solidFill>
+            </a:endParaRPr>
+          </a:p>
+          <a:p>
+            <a:pPr algn="ctr">
               <a:defRPr/>
             </a:pPr>
             <a:r>
-              <a:rPr lang="pt-BR" sz="2400" b="0" i="0" u="none" strike="noStrike" cap="none" spc="0">
+              <a:rPr sz="2800" b="1" u="none">
                 <a:solidFill>
-                  <a:schemeClr val="dk1"/>
+                  <a:schemeClr val="accent2">
+                    <a:lumMod val="75000"/>
+                  </a:schemeClr>
                 </a:solidFill>
-                <a:latin typeface="Arial"/>
-                <a:ea typeface="Arial"/>
-                <a:cs typeface="Arial"/>
               </a:rPr>
-              <a:t>O curso não tem gabaritos e respostas dos exercícios</a:t>
+              <a:t>SuperComputação começa quando Desafios de Programação acaba</a:t>
             </a:r>
+            <a:endParaRPr sz="2800" b="1" u="none">
+              <a:solidFill>
+                <a:schemeClr val="accent2">
+                  <a:lumMod val="75000"/>
+                </a:schemeClr>
+              </a:solidFill>
+            </a:endParaRPr>
+          </a:p>
+          <a:p>
+            <a:pPr algn="ctr">
+              <a:defRPr/>
+            </a:pPr>
+            <a:endParaRPr sz="2800" b="1" u="sng">
+              <a:solidFill>
+                <a:schemeClr val="accent2">
+                  <a:lumMod val="75000"/>
+                </a:schemeClr>
+              </a:solidFill>
+            </a:endParaRPr>
+          </a:p>
+          <a:p>
+            <a:pPr algn="l">
+              <a:defRPr/>
+            </a:pPr>
             <a:r>
-              <a:rPr lang="pt-BR" sz="2400" b="0" i="0" u="none" strike="noStrike" cap="none" spc="0">
+              <a:rPr sz="2400" b="0" u="none">
                 <a:solidFill>
-                  <a:schemeClr val="dk1"/>
+                  <a:schemeClr val="tx1"/>
                 </a:solidFill>
-                <a:latin typeface="Arial"/>
-                <a:ea typeface="Arial"/>
-                <a:cs typeface="Arial"/>
               </a:rPr>
-              <a:t>. Isto tem duas razões pedagógicas:</a:t>
+              <a:t>Já temos</a:t>
             </a:r>
-            <a:endParaRPr lang="pt-BR" sz="2400" b="0" i="0" u="none" strike="noStrike" cap="none" spc="0">
+            <a:endParaRPr sz="2400" b="0" u="none">
               <a:solidFill>
-                <a:schemeClr val="dk1"/>
+                <a:schemeClr val="tx1"/>
               </a:solidFill>
-              <a:latin typeface="Arial"/>
-              <a:ea typeface="Arial"/>
-              <a:cs typeface="Arial"/>
             </a:endParaRPr>
           </a:p>
           <a:p>
-            <a:pPr marL="349965" lvl="0" indent="-349965" algn="l">
-              <a:lnSpc>
-                <a:spcPct val="150000"/>
-              </a:lnSpc>
-              <a:spcBef>
-                <a:spcPts val="0"/>
-              </a:spcBef>
-              <a:spcAft>
-                <a:spcPts val="0"/>
-              </a:spcAft>
-              <a:buAutoNum type="arabicPeriod"/>
-              <a:defRPr/>
-            </a:pPr>
-            <a:endParaRPr lang="pt-BR" sz="2400" b="0" i="0" u="none" strike="noStrike" cap="none" spc="0">
+            <a:pPr algn="l">
+              <a:defRPr/>
+            </a:pPr>
+            <a:endParaRPr sz="2400" b="0" u="none">
               <a:solidFill>
-                <a:schemeClr val="dk1"/>
+                <a:schemeClr val="tx1"/>
               </a:solidFill>
-              <a:latin typeface="Arial"/>
-              <a:ea typeface="Arial"/>
-              <a:cs typeface="Arial"/>
             </a:endParaRPr>
           </a:p>
           <a:p>
-            <a:pPr marL="349965" lvl="0" indent="-349965" algn="l">
-              <a:lnSpc>
-                <a:spcPct val="150000"/>
-              </a:lnSpc>
-              <a:spcBef>
-                <a:spcPts val="0"/>
-              </a:spcBef>
-              <a:spcAft>
-                <a:spcPts val="0"/>
-              </a:spcAft>
-              <a:buAutoNum type="arabicPeriod"/>
-              <a:defRPr/>
-            </a:pPr>
-            <a:r>
-              <a:rPr lang="pt-BR" sz="2400" b="0" i="0" u="none" strike="noStrike" cap="none" spc="0">
-                <a:solidFill>
-                  <a:schemeClr val="dk1"/>
-                </a:solidFill>
-                <a:latin typeface="Arial"/>
-                <a:ea typeface="Arial"/>
-                <a:cs typeface="Arial"/>
-              </a:rPr>
-              <a:t>Copiar e colar atrapalha memorização e cria ilusão de aprendizado. </a:t>
-            </a:r>
-            <a:endParaRPr lang="pt-BR" sz="2400" b="0" i="0" u="none" strike="noStrike" cap="none" spc="0">
-              <a:solidFill>
-                <a:schemeClr val="dk1"/>
-              </a:solidFill>
-              <a:latin typeface="Arial"/>
-              <a:ea typeface="Arial"/>
-              <a:cs typeface="Arial"/>
-            </a:endParaRPr>
-          </a:p>
-          <a:p>
-            <a:pPr marL="349965" lvl="0" indent="-349965" algn="l">
-              <a:lnSpc>
-                <a:spcPct val="150000"/>
-              </a:lnSpc>
-              <a:spcBef>
-                <a:spcPts val="0"/>
-              </a:spcBef>
-              <a:spcAft>
-                <a:spcPts val="0"/>
-              </a:spcAft>
-              <a:buAutoNum type="arabicPeriod"/>
-              <a:defRPr/>
-            </a:pPr>
-            <a:r>
-              <a:rPr lang="pt-BR" sz="2400" b="0" i="0" u="none" strike="noStrike" cap="none" spc="0">
-                <a:solidFill>
-                  <a:schemeClr val="dk1"/>
-                </a:solidFill>
-                <a:latin typeface="Arial"/>
-                <a:ea typeface="Arial"/>
-                <a:cs typeface="Arial"/>
-              </a:rPr>
-              <a:t>Curso foca em algoritmos e em sua implementação eficiente.</a:t>
-            </a:r>
-            <a:endParaRPr lang="pt-BR" sz="2400" b="0" i="0" u="none" strike="noStrike" cap="none" spc="0">
-              <a:solidFill>
-                <a:schemeClr val="dk1"/>
-              </a:solidFill>
-              <a:latin typeface="Arial"/>
-              <a:ea typeface="Arial"/>
-              <a:cs typeface="Arial"/>
-            </a:endParaRPr>
-          </a:p>
-          <a:p>
-            <a:pPr marL="349965" lvl="0" indent="-349965" algn="l">
-              <a:lnSpc>
-                <a:spcPct val="150000"/>
-              </a:lnSpc>
-              <a:spcBef>
-                <a:spcPts val="0"/>
-              </a:spcBef>
-              <a:spcAft>
-                <a:spcPts val="0"/>
-              </a:spcAft>
-              <a:buAutoNum type="arabicPeriod"/>
-              <a:defRPr/>
-            </a:pPr>
-            <a:endParaRPr lang="pt-BR" sz="2400" b="0" i="0" u="none" strike="noStrike" cap="none" spc="0">
-              <a:solidFill>
-                <a:schemeClr val="dk1"/>
-              </a:solidFill>
-              <a:latin typeface="Arial"/>
-              <a:ea typeface="Arial"/>
-              <a:cs typeface="Arial"/>
-            </a:endParaRPr>
-          </a:p>
-          <a:p>
-            <a:pPr marL="349965" lvl="0" indent="-349965" algn="l">
-              <a:lnSpc>
-                <a:spcPct val="150000"/>
-              </a:lnSpc>
-              <a:spcBef>
-                <a:spcPts val="0"/>
-              </a:spcBef>
-              <a:spcAft>
-                <a:spcPts val="0"/>
-              </a:spcAft>
+            <a:pPr marL="394023" indent="-394023" algn="l">
               <a:buFont typeface="Arial"/>
               <a:buChar char="•"/>
               <a:defRPr/>
             </a:pPr>
-            <a:endParaRPr lang="pt-BR" sz="2400" b="0" i="0" u="none" strike="noStrike" cap="none" spc="0">
+            <a:r>
+              <a:rPr sz="2400" b="0" u="none">
+                <a:solidFill>
+                  <a:schemeClr val="tx1"/>
+                </a:solidFill>
+              </a:rPr>
+              <a:t>um bom algoritmo (complexidade computacional)</a:t>
+            </a:r>
+            <a:endParaRPr sz="2400" b="0" u="none">
               <a:solidFill>
-                <a:schemeClr val="dk1"/>
+                <a:schemeClr val="tx1"/>
               </a:solidFill>
-              <a:latin typeface="Arial"/>
-              <a:ea typeface="Arial"/>
-              <a:cs typeface="Arial"/>
             </a:endParaRPr>
           </a:p>
           <a:p>
-            <a:pPr marL="349965" lvl="0" indent="-349965" algn="l">
-              <a:lnSpc>
-                <a:spcPct val="150000"/>
-              </a:lnSpc>
-              <a:spcBef>
-                <a:spcPts val="0"/>
-              </a:spcBef>
-              <a:spcAft>
-                <a:spcPts val="0"/>
-              </a:spcAft>
+            <a:pPr marL="394023" indent="-394023" algn="l">
               <a:buFont typeface="Arial"/>
               <a:buChar char="•"/>
               <a:defRPr/>
             </a:pPr>
-            <a:endParaRPr lang="pt-BR" sz="2400" b="0" i="0" u="none" strike="noStrike" cap="none" spc="0">
+            <a:r>
+              <a:rPr sz="2400" b="0" u="none">
+                <a:solidFill>
+                  <a:schemeClr val="tx1"/>
+                </a:solidFill>
+              </a:rPr>
+              <a:t>estruturas de dados eficientes</a:t>
+            </a:r>
+            <a:endParaRPr sz="2400" b="0" u="none">
               <a:solidFill>
-                <a:schemeClr val="dk1"/>
+                <a:schemeClr val="tx1"/>
               </a:solidFill>
-              <a:latin typeface="Arial"/>
-              <a:ea typeface="Arial"/>
-              <a:cs typeface="Arial"/>
             </a:endParaRPr>
           </a:p>
           <a:p>
-            <a:pPr marL="349965" lvl="0" indent="-349965" algn="l">
-              <a:lnSpc>
-                <a:spcPct val="150000"/>
-              </a:lnSpc>
-              <a:spcBef>
-                <a:spcPts val="0"/>
-              </a:spcBef>
-              <a:spcAft>
-                <a:spcPts val="0"/>
-              </a:spcAft>
+            <a:pPr marL="394023" indent="-394023" algn="l">
               <a:buFont typeface="Arial"/>
               <a:buChar char="•"/>
               <a:defRPr/>
             </a:pPr>
-            <a:endParaRPr lang="pt-BR" sz="2400" b="0" i="0" u="none" strike="noStrike" cap="none" spc="0">
+            <a:r>
+              <a:rPr sz="2400" b="0" u="none">
+                <a:solidFill>
+                  <a:schemeClr val="tx1"/>
+                </a:solidFill>
+              </a:rPr>
+              <a:t>uma implementação inocente desse algoritmo</a:t>
+            </a:r>
+            <a:endParaRPr sz="2800" b="0" u="none">
               <a:solidFill>
-                <a:schemeClr val="dk1"/>
+                <a:schemeClr val="tx1"/>
               </a:solidFill>
-              <a:latin typeface="Arial"/>
-              <a:ea typeface="Arial"/>
-              <a:cs typeface="Arial"/>
-            </a:endParaRPr>
-          </a:p>
-          <a:p>
-            <a:pPr marL="349965" lvl="0" indent="-349965" algn="l">
-              <a:lnSpc>
-                <a:spcPct val="150000"/>
-              </a:lnSpc>
-              <a:spcBef>
-                <a:spcPts val="0"/>
-              </a:spcBef>
-              <a:spcAft>
-                <a:spcPts val="0"/>
-              </a:spcAft>
-              <a:buFont typeface="Arial"/>
-              <a:buChar char="•"/>
-              <a:defRPr/>
-            </a:pPr>
-            <a:endParaRPr lang="pt-BR" sz="2400" b="0" i="0" u="sng" strike="noStrike" cap="none">
-              <a:solidFill>
-                <a:schemeClr val="dk1"/>
-              </a:solidFill>
-              <a:latin typeface="Arial"/>
-              <a:ea typeface="Arial"/>
-              <a:cs typeface="Arial"/>
-            </a:endParaRPr>
-          </a:p>
-          <a:p>
-            <a:pPr marL="349965" lvl="0" indent="-349965" algn="l">
-              <a:lnSpc>
-                <a:spcPct val="150000"/>
-              </a:lnSpc>
-              <a:spcBef>
-                <a:spcPts val="0"/>
-              </a:spcBef>
-              <a:spcAft>
-                <a:spcPts val="0"/>
-              </a:spcAft>
-              <a:buAutoNum type="arabicPeriod"/>
-              <a:defRPr/>
-            </a:pPr>
-            <a:endParaRPr lang="pt-BR" sz="2400" b="0" i="0" u="none" strike="noStrike" cap="none">
-              <a:solidFill>
-                <a:schemeClr val="dk1"/>
-              </a:solidFill>
-              <a:latin typeface="Arial"/>
-              <a:ea typeface="Arial"/>
-              <a:cs typeface="Arial"/>
             </a:endParaRPr>
           </a:p>
         </p:txBody>

</xml_diff>

<commit_message>
Deployed 2583d6d with MkDocs version: 1.1.2
</commit_message>
<xml_diff>
--- a/aulas/02-desempenho/slides.pptx
+++ b/aulas/02-desempenho/slides.pptx
@@ -13272,7 +13272,7 @@
             </a:pPr>
             <a:r>
               <a:rPr sz="2000" b="0"/>
-              <a:t>Implementar um algoritmo simples</a:t>
+              <a:t>Implementar algoritmos simples usando recursos de C++</a:t>
             </a:r>
             <a:endParaRPr sz="2000" b="0"/>
           </a:p>
@@ -14081,7 +14081,7 @@
         </p:blipFill>
         <p:spPr bwMode="auto">
           <a:xfrm flipH="0" flipV="0">
-            <a:off x="404460" y="1526177"/>
+            <a:off x="404460" y="1526176"/>
             <a:ext cx="8227244" cy="4460067"/>
           </a:xfrm>
           <a:prstGeom prst="rect">
@@ -16158,7 +16158,7 @@
         <p:spPr bwMode="auto">
           <a:xfrm flipH="0" flipV="0">
             <a:off x="309227" y="2760795"/>
-            <a:ext cx="8704382" cy="4976430"/>
+            <a:ext cx="8704382" cy="4976429"/>
           </a:xfrm>
           <a:prstGeom prst="rect">
             <a:avLst/>

</xml_diff>

<commit_message>
Deployed 1a6305f with MkDocs version: 1.1.2
</commit_message>
<xml_diff>
--- a/aulas/02-desempenho/slides.pptx
+++ b/aulas/02-desempenho/slides.pptx
@@ -21,7 +21,6 @@
     <p:sldId id="268" r:id="rId17"/>
     <p:sldId id="269" r:id="rId18"/>
     <p:sldId id="270" r:id="rId19"/>
-    <p:sldId id="271" r:id="rId20"/>
   </p:sldIdLst>
   <p:sldSz cx="9144000" cy="6858000" type="screen4x3"/>
   <p:notesSz cx="6858000" cy="9144000"/>
@@ -13369,7 +13368,7 @@
                 <a:ea typeface="Verdana"/>
                 <a:cs typeface="Verdana"/>
               </a:rPr>
-              <a:t>Medição de tempo</a:t>
+              <a:t>Atividade prática</a:t>
             </a:r>
             <a:endParaRPr sz="3600" b="1" i="0" u="none" strike="noStrike" cap="none">
               <a:solidFill>
@@ -13459,199 +13458,7 @@
               <a:buNone/>
               <a:defRPr/>
             </a:pPr>
-            <a:fld id="{C2581D0F-81C8-5D84-8B47-C810591E47F2}" type="slidenum">
-              <a:rPr lang="pt-BR" sz="1000" b="0" i="0" u="none" strike="noStrike" cap="none">
-                <a:solidFill>
-                  <a:srgbClr val="B2B2B2"/>
-                </a:solidFill>
-                <a:latin typeface="Verdana"/>
-                <a:ea typeface="Verdana"/>
-                <a:cs typeface="Verdana"/>
-              </a:rPr>
-              <a:t/>
-            </a:fld>
-            <a:endParaRPr sz="1000" b="0" i="0" u="none" strike="noStrike" cap="none">
-              <a:solidFill>
-                <a:schemeClr val="dk1"/>
-              </a:solidFill>
-              <a:latin typeface="Arial"/>
-              <a:ea typeface="Arial"/>
-              <a:cs typeface="Arial"/>
-            </a:endParaRPr>
-          </a:p>
-        </p:txBody>
-      </p:sp>
-    </p:spTree>
-  </p:cSld>
-  <p:clrMapOvr>
-    <a:masterClrMapping/>
-  </p:clrMapOvr>
-  <mc:AlternateContent xmlns:mc="http://schemas.openxmlformats.org/markup-compatibility/2006">
-    <mc:Choice xmlns:p14="http://schemas.microsoft.com/office/powerpoint/2010/main" Requires="p14">
-      <p:transition p14:dur="2000" advClick="1"/>
-    </mc:Choice>
-    <mc:Fallback>
-      <p:transition advClick="1"/>
-    </mc:Fallback>
-  </mc:AlternateContent>
-</p:sld>
-</file>
-
-<file path=ppt/slides/slide12.xml><?xml version="1.0" encoding="utf-8"?>
-<p:sld xmlns:a="http://schemas.openxmlformats.org/drawingml/2006/main" xmlns:r="http://schemas.openxmlformats.org/officeDocument/2006/relationships" xmlns:p="http://schemas.openxmlformats.org/presentationml/2006/main" xmlns:m="http://schemas.openxmlformats.org/officeDocument/2006/math" xmlns:w="http://schemas.openxmlformats.org/wordprocessingml/2006/main" showMasterPhAnim="0" show="1">
-  <p:cSld name="">
-    <p:spTree>
-      <p:nvGrpSpPr>
-        <p:cNvPr id="1" name="" hidden="0"/>
-        <p:cNvGrpSpPr/>
-        <p:nvPr isPhoto="0" userDrawn="0"/>
-      </p:nvGrpSpPr>
-      <p:grpSpPr bwMode="auto">
-        <a:xfrm>
-          <a:off x="0" y="0"/>
-          <a:ext cx="0" cy="0"/>
-          <a:chOff x="0" y="0"/>
-          <a:chExt cx="0" cy="0"/>
-        </a:xfrm>
-      </p:grpSpPr>
-      <p:sp>
-        <p:nvSpPr>
-          <p:cNvPr id="4" name="Google Shape;267;p55" hidden="0"/>
-          <p:cNvSpPr/>
-          <p:nvPr isPhoto="0" userDrawn="0"/>
-        </p:nvSpPr>
-        <p:spPr bwMode="auto">
-          <a:xfrm>
-            <a:off x="457200" y="781200"/>
-            <a:ext cx="8228520" cy="618120"/>
-          </a:xfrm>
-          <a:prstGeom prst="rect">
-            <a:avLst/>
-          </a:prstGeom>
-          <a:noFill/>
-          <a:ln>
-            <a:noFill/>
-          </a:ln>
-        </p:spPr>
-        <p:txBody>
-          <a:bodyPr spcFirstLastPara="1" wrap="square" lIns="90000" tIns="45000" rIns="90000" bIns="45000" anchor="t" anchorCtr="0">
-            <a:noAutofit/>
-          </a:bodyPr>
-          <a:lstStyle/>
-          <a:p>
-            <a:pPr marL="0" marR="0" lvl="0" indent="0" algn="l">
-              <a:lnSpc>
-                <a:spcPct val="100000"/>
-              </a:lnSpc>
-              <a:spcBef>
-                <a:spcPts val="0"/>
-              </a:spcBef>
-              <a:spcAft>
-                <a:spcPts val="0"/>
-              </a:spcAft>
-              <a:buNone/>
-              <a:defRPr/>
-            </a:pPr>
-            <a:r>
-              <a:rPr lang="pt-BR" sz="3200" b="0" i="0" u="none" strike="noStrike" cap="none">
-                <a:solidFill>
-                  <a:srgbClr val="C00026"/>
-                </a:solidFill>
-                <a:latin typeface="Verdana"/>
-                <a:ea typeface="Verdana"/>
-                <a:cs typeface="Verdana"/>
-              </a:rPr>
-              <a:t>Profiling</a:t>
-            </a:r>
-            <a:endParaRPr sz="3200" b="0" i="0" u="none" strike="noStrike" cap="none">
-              <a:solidFill>
-                <a:schemeClr val="dk1"/>
-              </a:solidFill>
-              <a:latin typeface="Arial"/>
-              <a:ea typeface="Arial"/>
-              <a:cs typeface="Arial"/>
-            </a:endParaRPr>
-          </a:p>
-        </p:txBody>
-      </p:sp>
-      <p:sp>
-        <p:nvSpPr>
-          <p:cNvPr id="5" name="Google Shape;268;p55" hidden="0"/>
-          <p:cNvSpPr/>
-          <p:nvPr isPhoto="0" userDrawn="0"/>
-        </p:nvSpPr>
-        <p:spPr bwMode="auto">
-          <a:xfrm>
-            <a:off x="162000" y="85680"/>
-            <a:ext cx="7228440" cy="351360"/>
-          </a:xfrm>
-          <a:prstGeom prst="rect">
-            <a:avLst/>
-          </a:prstGeom>
-          <a:noFill/>
-          <a:ln>
-            <a:noFill/>
-          </a:ln>
-        </p:spPr>
-        <p:txBody>
-          <a:bodyPr spcFirstLastPara="1" wrap="square" lIns="91422" tIns="91422" rIns="91422" bIns="91422" anchor="ctr" anchorCtr="0">
-            <a:noAutofit/>
-          </a:bodyPr>
-          <a:lstStyle/>
-          <a:p>
-            <a:pPr marL="0" lvl="0" indent="0" algn="l">
-              <a:spcBef>
-                <a:spcPts val="0"/>
-              </a:spcBef>
-              <a:spcAft>
-                <a:spcPts val="0"/>
-              </a:spcAft>
-              <a:buNone/>
-              <a:defRPr/>
-            </a:pPr>
-            <a:endParaRPr/>
-          </a:p>
-        </p:txBody>
-      </p:sp>
-      <p:sp>
-        <p:nvSpPr>
-          <p:cNvPr id="6" name="Google Shape;269;p55" hidden="0"/>
-          <p:cNvSpPr/>
-          <p:nvPr isPhoto="0" userDrawn="0"/>
-        </p:nvSpPr>
-        <p:spPr bwMode="auto">
-          <a:xfrm>
-            <a:off x="84240" y="6402240"/>
-            <a:ext cx="640440" cy="363960"/>
-          </a:xfrm>
-          <a:prstGeom prst="rect">
-            <a:avLst/>
-          </a:prstGeom>
-          <a:noFill/>
-          <a:ln>
-            <a:noFill/>
-          </a:ln>
-        </p:spPr>
-        <p:txBody>
-          <a:bodyPr spcFirstLastPara="1" wrap="square" lIns="90000" tIns="45000" rIns="90000" bIns="45000" anchor="ctr" anchorCtr="0">
-            <a:noAutofit/>
-          </a:bodyPr>
-          <a:lstStyle/>
-          <a:p>
-            <a:pPr marL="0" marR="0" lvl="0" indent="0" algn="r">
-              <a:lnSpc>
-                <a:spcPct val="100000"/>
-              </a:lnSpc>
-              <a:spcBef>
-                <a:spcPts val="0"/>
-              </a:spcBef>
-              <a:spcAft>
-                <a:spcPts val="0"/>
-              </a:spcAft>
-              <a:buNone/>
-              <a:defRPr/>
-            </a:pPr>
-            <a:fld id="{2AEA4DEC-F606-9A77-49F9-6F4328295D55}" type="slidenum">
+            <a:fld id="{3E9D85EF-0F32-EF56-F3D8-402E927DCC72}" type="slidenum">
               <a:rPr lang="pt-BR" sz="1000" b="0" i="0" u="none" strike="noStrike" cap="none">
                 <a:solidFill>
                   <a:srgbClr val="B2B2B2"/>
@@ -13675,169 +13482,33 @@
       </p:sp>
       <p:sp>
         <p:nvSpPr>
-          <p:cNvPr id="7" name="Google Shape;270;p55" hidden="0"/>
-          <p:cNvSpPr>
-            <a:spLocks noAdjustHandles="0" noChangeArrowheads="0"/>
-          </p:cNvSpPr>
+          <p:cNvPr id="7" name="" hidden="0"/>
+          <p:cNvSpPr/>
           <p:nvPr isPhoto="0" userDrawn="0"/>
         </p:nvSpPr>
         <p:spPr bwMode="auto">
           <a:xfrm flipH="0" flipV="0">
-            <a:off x="309227" y="1588487"/>
-            <a:ext cx="8704381" cy="4976428"/>
+            <a:off x="724677" y="4088421"/>
+            <a:ext cx="8137933" cy="363449"/>
           </a:xfrm>
           <a:prstGeom prst="rect">
             <a:avLst/>
           </a:prstGeom>
           <a:noFill/>
-          <a:ln>
-            <a:noFill/>
-          </a:ln>
         </p:spPr>
         <p:txBody>
-          <a:bodyPr spcFirstLastPara="1" wrap="square" lIns="91422" tIns="45696" rIns="91422" bIns="45696" anchor="t" anchorCtr="0">
+          <a:bodyPr vertOverflow="overflow" horzOverflow="clip" vert="horz" wrap="square" lIns="91440" tIns="45720" rIns="91440" bIns="45720" numCol="1" spcCol="0" rtlCol="0" fromWordArt="0" anchor="t" anchorCtr="0" forceAA="0" upright="0" compatLnSpc="0">
             <a:noAutofit/>
           </a:bodyPr>
-          <a:lstStyle/>
           <a:p>
-            <a:pPr algn="l">
-              <a:defRPr/>
-            </a:pPr>
-            <a:endParaRPr sz="2400" b="1" u="sng">
-              <a:solidFill>
-                <a:schemeClr val="accent2"/>
-              </a:solidFill>
-            </a:endParaRPr>
-          </a:p>
-          <a:p>
-            <a:pPr algn="l">
-              <a:defRPr/>
-            </a:pPr>
-            <a:endParaRPr sz="2400" b="1" u="sng">
-              <a:solidFill>
-                <a:schemeClr val="accent2"/>
-              </a:solidFill>
-            </a:endParaRPr>
-          </a:p>
-          <a:p>
-            <a:pPr algn="ctr">
+            <a:pPr>
               <a:defRPr/>
             </a:pPr>
             <a:r>
-              <a:rPr sz="2800" b="0" u="none">
-                <a:solidFill>
-                  <a:schemeClr val="tx1"/>
-                </a:solidFill>
-              </a:rPr>
-              <a:t>Análise de um programa durante sua execução para determinar seu consumo de memória e/ou tempo.</a:t>
+              <a:rPr sz="2000" b="1"/>
+              <a:t>20 minutos para Parte 1 - Alocação de memória ....</a:t>
             </a:r>
-            <a:endParaRPr sz="2800" b="0" u="none">
-              <a:solidFill>
-                <a:schemeClr val="tx1"/>
-              </a:solidFill>
-            </a:endParaRPr>
-          </a:p>
-          <a:p>
-            <a:pPr algn="ctr">
-              <a:defRPr/>
-            </a:pPr>
-            <a:endParaRPr sz="2800" b="1" u="sng">
-              <a:solidFill>
-                <a:schemeClr val="accent2">
-                  <a:lumMod val="75000"/>
-                </a:schemeClr>
-              </a:solidFill>
-            </a:endParaRPr>
-          </a:p>
-          <a:p>
-            <a:pPr algn="l">
-              <a:defRPr/>
-            </a:pPr>
-            <a:endParaRPr sz="2400" b="0" u="none">
-              <a:solidFill>
-                <a:schemeClr val="tx1"/>
-              </a:solidFill>
-            </a:endParaRPr>
-          </a:p>
-          <a:p>
-            <a:pPr algn="l">
-              <a:defRPr/>
-            </a:pPr>
-            <a:r>
-              <a:rPr sz="2400" b="0" u="none">
-                <a:solidFill>
-                  <a:schemeClr val="tx1"/>
-                </a:solidFill>
-              </a:rPr>
-              <a:t>Podemos responder duas importantes perguntas:</a:t>
-            </a:r>
-            <a:endParaRPr sz="2400" b="0" u="none">
-              <a:solidFill>
-                <a:schemeClr val="tx1"/>
-              </a:solidFill>
-            </a:endParaRPr>
-          </a:p>
-          <a:p>
-            <a:pPr algn="l">
-              <a:defRPr/>
-            </a:pPr>
-            <a:endParaRPr sz="2400" b="0" u="none">
-              <a:solidFill>
-                <a:schemeClr val="tx1"/>
-              </a:solidFill>
-            </a:endParaRPr>
-          </a:p>
-          <a:p>
-            <a:pPr marL="394022" indent="-394022" algn="l">
-              <a:buFont typeface="Arial"/>
-              <a:buChar char="•"/>
-              <a:defRPr/>
-            </a:pPr>
-            <a:r>
-              <a:rPr sz="2400" b="0" u="none">
-                <a:solidFill>
-                  <a:schemeClr val="tx1"/>
-                </a:solidFill>
-              </a:rPr>
-              <a:t>onde o programa consome mais recursos?</a:t>
-            </a:r>
-            <a:endParaRPr sz="2400" b="0" u="none">
-              <a:solidFill>
-                <a:schemeClr val="tx1"/>
-              </a:solidFill>
-            </a:endParaRPr>
-          </a:p>
-          <a:p>
-            <a:pPr marL="394022" indent="-394022" algn="l">
-              <a:buFont typeface="Arial"/>
-              <a:buChar char="•"/>
-              <a:defRPr/>
-            </a:pPr>
-            <a:r>
-              <a:rPr sz="2400" b="0" u="none">
-                <a:solidFill>
-                  <a:schemeClr val="tx1"/>
-                </a:solidFill>
-              </a:rPr>
-              <a:t>onde devo concentrar meus esforços de otimização?</a:t>
-            </a:r>
-            <a:endParaRPr sz="2400" b="0" u="none">
-              <a:solidFill>
-                <a:schemeClr val="tx1"/>
-              </a:solidFill>
-            </a:endParaRPr>
-          </a:p>
-          <a:p>
-            <a:pPr marL="394022" indent="-394022" algn="l">
-              <a:buFont typeface="Arial"/>
-              <a:buChar char="•"/>
-              <a:defRPr/>
-            </a:pPr>
-            <a:endParaRPr sz="2800" b="0" u="none">
-              <a:solidFill>
-                <a:schemeClr val="tx1"/>
-              </a:solidFill>
-            </a:endParaRPr>
+            <a:endParaRPr sz="2000" b="1"/>
           </a:p>
         </p:txBody>
       </p:sp>
@@ -13857,255 +13528,7 @@
 </p:sld>
 </file>
 
-<file path=ppt/slides/slide13.xml><?xml version="1.0" encoding="utf-8"?>
-<p:sld xmlns:a="http://schemas.openxmlformats.org/drawingml/2006/main" xmlns:r="http://schemas.openxmlformats.org/officeDocument/2006/relationships" xmlns:p="http://schemas.openxmlformats.org/presentationml/2006/main" xmlns:m="http://schemas.openxmlformats.org/officeDocument/2006/math" xmlns:w="http://schemas.openxmlformats.org/wordprocessingml/2006/main" showMasterPhAnim="0" show="1">
-  <p:cSld name="">
-    <p:spTree>
-      <p:nvGrpSpPr>
-        <p:cNvPr id="1" name="" hidden="0"/>
-        <p:cNvGrpSpPr/>
-        <p:nvPr isPhoto="0" userDrawn="0"/>
-      </p:nvGrpSpPr>
-      <p:grpSpPr bwMode="auto">
-        <a:xfrm>
-          <a:off x="0" y="0"/>
-          <a:ext cx="0" cy="0"/>
-          <a:chOff x="0" y="0"/>
-          <a:chExt cx="0" cy="0"/>
-        </a:xfrm>
-      </p:grpSpPr>
-      <p:sp>
-        <p:nvSpPr>
-          <p:cNvPr id="4" name="Google Shape;267;p55" hidden="0"/>
-          <p:cNvSpPr/>
-          <p:nvPr isPhoto="0" userDrawn="0"/>
-        </p:nvSpPr>
-        <p:spPr bwMode="auto">
-          <a:xfrm>
-            <a:off x="457200" y="781200"/>
-            <a:ext cx="8228520" cy="618120"/>
-          </a:xfrm>
-          <a:prstGeom prst="rect">
-            <a:avLst/>
-          </a:prstGeom>
-          <a:noFill/>
-          <a:ln>
-            <a:noFill/>
-          </a:ln>
-        </p:spPr>
-        <p:txBody>
-          <a:bodyPr spcFirstLastPara="1" wrap="square" lIns="90000" tIns="45000" rIns="90000" bIns="45000" anchor="t" anchorCtr="0">
-            <a:noAutofit/>
-          </a:bodyPr>
-          <a:lstStyle/>
-          <a:p>
-            <a:pPr marL="0" marR="0" lvl="0" indent="0" algn="l">
-              <a:lnSpc>
-                <a:spcPct val="100000"/>
-              </a:lnSpc>
-              <a:spcBef>
-                <a:spcPts val="0"/>
-              </a:spcBef>
-              <a:spcAft>
-                <a:spcPts val="0"/>
-              </a:spcAft>
-              <a:buNone/>
-              <a:defRPr/>
-            </a:pPr>
-            <a:r>
-              <a:rPr lang="pt-BR" sz="3200" b="0" i="0" u="none" strike="noStrike" cap="none">
-                <a:solidFill>
-                  <a:srgbClr val="C00026"/>
-                </a:solidFill>
-                <a:latin typeface="Verdana"/>
-                <a:ea typeface="Verdana"/>
-                <a:cs typeface="Verdana"/>
-              </a:rPr>
-              <a:t>KCachegrind</a:t>
-            </a:r>
-            <a:endParaRPr sz="3200" b="0" i="0" u="none" strike="noStrike" cap="none">
-              <a:solidFill>
-                <a:schemeClr val="dk1"/>
-              </a:solidFill>
-              <a:latin typeface="Arial"/>
-              <a:ea typeface="Arial"/>
-              <a:cs typeface="Arial"/>
-            </a:endParaRPr>
-          </a:p>
-        </p:txBody>
-      </p:sp>
-      <p:sp>
-        <p:nvSpPr>
-          <p:cNvPr id="5" name="Google Shape;268;p55" hidden="0"/>
-          <p:cNvSpPr/>
-          <p:nvPr isPhoto="0" userDrawn="0"/>
-        </p:nvSpPr>
-        <p:spPr bwMode="auto">
-          <a:xfrm>
-            <a:off x="162000" y="85680"/>
-            <a:ext cx="7228440" cy="351360"/>
-          </a:xfrm>
-          <a:prstGeom prst="rect">
-            <a:avLst/>
-          </a:prstGeom>
-          <a:noFill/>
-          <a:ln>
-            <a:noFill/>
-          </a:ln>
-        </p:spPr>
-        <p:txBody>
-          <a:bodyPr spcFirstLastPara="1" wrap="square" lIns="91422" tIns="91422" rIns="91422" bIns="91422" anchor="ctr" anchorCtr="0">
-            <a:noAutofit/>
-          </a:bodyPr>
-          <a:lstStyle/>
-          <a:p>
-            <a:pPr marL="0" lvl="0" indent="0" algn="l">
-              <a:spcBef>
-                <a:spcPts val="0"/>
-              </a:spcBef>
-              <a:spcAft>
-                <a:spcPts val="0"/>
-              </a:spcAft>
-              <a:buNone/>
-              <a:defRPr/>
-            </a:pPr>
-            <a:endParaRPr/>
-          </a:p>
-        </p:txBody>
-      </p:sp>
-      <p:sp>
-        <p:nvSpPr>
-          <p:cNvPr id="6" name="Google Shape;269;p55" hidden="0"/>
-          <p:cNvSpPr/>
-          <p:nvPr isPhoto="0" userDrawn="0"/>
-        </p:nvSpPr>
-        <p:spPr bwMode="auto">
-          <a:xfrm>
-            <a:off x="84240" y="6402240"/>
-            <a:ext cx="640440" cy="363960"/>
-          </a:xfrm>
-          <a:prstGeom prst="rect">
-            <a:avLst/>
-          </a:prstGeom>
-          <a:noFill/>
-          <a:ln>
-            <a:noFill/>
-          </a:ln>
-        </p:spPr>
-        <p:txBody>
-          <a:bodyPr spcFirstLastPara="1" wrap="square" lIns="90000" tIns="45000" rIns="90000" bIns="45000" anchor="ctr" anchorCtr="0">
-            <a:noAutofit/>
-          </a:bodyPr>
-          <a:lstStyle/>
-          <a:p>
-            <a:pPr marL="0" marR="0" lvl="0" indent="0" algn="r">
-              <a:lnSpc>
-                <a:spcPct val="100000"/>
-              </a:lnSpc>
-              <a:spcBef>
-                <a:spcPts val="0"/>
-              </a:spcBef>
-              <a:spcAft>
-                <a:spcPts val="0"/>
-              </a:spcAft>
-              <a:buNone/>
-              <a:defRPr/>
-            </a:pPr>
-            <a:fld id="{68375C5C-0F1F-37C0-9399-D2618FFD1B99}" type="slidenum">
-              <a:rPr lang="pt-BR" sz="1000" b="0" i="0" u="none" strike="noStrike" cap="none">
-                <a:solidFill>
-                  <a:srgbClr val="B2B2B2"/>
-                </a:solidFill>
-                <a:latin typeface="Verdana"/>
-                <a:ea typeface="Verdana"/>
-                <a:cs typeface="Verdana"/>
-              </a:rPr>
-              <a:t/>
-            </a:fld>
-            <a:endParaRPr sz="1000" b="0" i="0" u="none" strike="noStrike" cap="none">
-              <a:solidFill>
-                <a:schemeClr val="dk1"/>
-              </a:solidFill>
-              <a:latin typeface="Arial"/>
-              <a:ea typeface="Arial"/>
-              <a:cs typeface="Arial"/>
-            </a:endParaRPr>
-          </a:p>
-        </p:txBody>
-      </p:sp>
-      <p:sp>
-        <p:nvSpPr>
-          <p:cNvPr id="7" name="Google Shape;270;p55" hidden="0"/>
-          <p:cNvSpPr>
-            <a:spLocks noAdjustHandles="0" noChangeArrowheads="0"/>
-          </p:cNvSpPr>
-          <p:nvPr isPhoto="0" userDrawn="0"/>
-        </p:nvSpPr>
-        <p:spPr bwMode="auto">
-          <a:xfrm flipH="0" flipV="0">
-            <a:off x="309227" y="1588487"/>
-            <a:ext cx="8704381" cy="4976428"/>
-          </a:xfrm>
-          <a:prstGeom prst="rect">
-            <a:avLst/>
-          </a:prstGeom>
-          <a:noFill/>
-          <a:ln>
-            <a:noFill/>
-          </a:ln>
-        </p:spPr>
-        <p:txBody>
-          <a:bodyPr spcFirstLastPara="1" wrap="square" lIns="91422" tIns="45696" rIns="91422" bIns="45696" anchor="t" anchorCtr="0">
-            <a:noAutofit/>
-          </a:bodyPr>
-          <a:lstStyle/>
-          <a:p>
-            <a:pPr>
-              <a:defRPr/>
-            </a:pPr>
-            <a:endParaRPr/>
-          </a:p>
-        </p:txBody>
-      </p:sp>
-      <p:pic>
-        <p:nvPicPr>
-          <p:cNvPr id="8" name="" hidden="0"/>
-          <p:cNvPicPr>
-            <a:picLocks noChangeAspect="1"/>
-          </p:cNvPicPr>
-          <p:nvPr isPhoto="0" userDrawn="0"/>
-        </p:nvPicPr>
-        <p:blipFill>
-          <a:blip r:embed="rId2"/>
-          <a:stretch/>
-        </p:blipFill>
-        <p:spPr bwMode="auto">
-          <a:xfrm flipH="0" flipV="0">
-            <a:off x="404460" y="1526176"/>
-            <a:ext cx="8227244" cy="4460067"/>
-          </a:xfrm>
-          <a:prstGeom prst="rect">
-            <a:avLst/>
-          </a:prstGeom>
-        </p:spPr>
-      </p:pic>
-    </p:spTree>
-  </p:cSld>
-  <p:clrMapOvr>
-    <a:masterClrMapping/>
-  </p:clrMapOvr>
-  <mc:AlternateContent xmlns:mc="http://schemas.openxmlformats.org/markup-compatibility/2006">
-    <mc:Choice xmlns:p14="http://schemas.microsoft.com/office/powerpoint/2010/main" Requires="p14">
-      <p:transition p14:dur="2000" advClick="1"/>
-    </mc:Choice>
-    <mc:Fallback>
-      <p:transition advClick="1"/>
-    </mc:Fallback>
-  </mc:AlternateContent>
-</p:sld>
-</file>
-
-<file path=ppt/slides/slide14.xml><?xml version="1.0" encoding="utf-8"?>
+<file path=ppt/slides/slide12.xml><?xml version="1.0" encoding="utf-8"?>
 <p:sld xmlns:a="http://schemas.openxmlformats.org/drawingml/2006/main" xmlns:r="http://schemas.openxmlformats.org/officeDocument/2006/relationships" xmlns:p="http://schemas.openxmlformats.org/presentationml/2006/main" xmlns:m="http://schemas.openxmlformats.org/officeDocument/2006/math" xmlns:w="http://schemas.openxmlformats.org/wordprocessingml/2006/main" showMasterPhAnim="0" show="1">
   <p:cSld name="">
     <p:spTree>
@@ -14259,7 +13682,7 @@
               <a:buNone/>
               <a:defRPr/>
             </a:pPr>
-            <a:fld id="{97EB1981-4163-74B3-5B47-4934A2BD21C9}" type="slidenum">
+            <a:fld id="{934BE706-F0BD-65B0-579E-EA6BF6D4F8A0}" type="slidenum">
               <a:rPr lang="pt-BR" sz="1000" b="0" i="0" u="none" strike="noStrike" cap="none">
                 <a:solidFill>
                   <a:srgbClr val="B2B2B2"/>
@@ -14307,7 +13730,7 @@
             </a:pPr>
             <a:r>
               <a:rPr sz="2000" b="1"/>
-              <a:t>Uma primeira tentativa de otimização</a:t>
+              <a:t>30 minutos para Parte 2 e 3 ....</a:t>
             </a:r>
             <a:endParaRPr sz="2000" b="1"/>
           </a:p>
@@ -14315,28 +13738,6 @@
             <a:pPr>
               <a:defRPr/>
             </a:pPr>
-            <a:endParaRPr sz="2000"/>
-          </a:p>
-          <a:p>
-            <a:pPr marL="305907" indent="-305907">
-              <a:buAutoNum type="arabicPeriod"/>
-              <a:defRPr/>
-            </a:pPr>
-            <a:r>
-              <a:rPr sz="2000" b="0"/>
-              <a:t>Implementar uma otimização simples</a:t>
-            </a:r>
-            <a:endParaRPr sz="2000" b="0"/>
-          </a:p>
-          <a:p>
-            <a:pPr marL="305906" indent="-305906">
-              <a:buAutoNum type="arabicPeriod"/>
-              <a:defRPr/>
-            </a:pPr>
-            <a:r>
-              <a:rPr sz="2000" b="0"/>
-              <a:t>Verificar se houve melhora usando o KCachegrind</a:t>
-            </a:r>
             <a:endParaRPr sz="2000" b="0"/>
           </a:p>
         </p:txBody>
@@ -14357,7 +13758,237 @@
 </p:sld>
 </file>
 
-<file path=ppt/slides/slide15.xml><?xml version="1.0" encoding="utf-8"?>
+<file path=ppt/slides/slide13.xml><?xml version="1.0" encoding="utf-8"?>
+<p:sld xmlns:a="http://schemas.openxmlformats.org/drawingml/2006/main" xmlns:r="http://schemas.openxmlformats.org/officeDocument/2006/relationships" xmlns:p="http://schemas.openxmlformats.org/presentationml/2006/main" xmlns:m="http://schemas.openxmlformats.org/officeDocument/2006/math" xmlns:w="http://schemas.openxmlformats.org/wordprocessingml/2006/main" showMasterPhAnim="0" show="1">
+  <p:cSld name="">
+    <p:spTree>
+      <p:nvGrpSpPr>
+        <p:cNvPr id="1" name="" hidden="0"/>
+        <p:cNvGrpSpPr/>
+        <p:nvPr isPhoto="0" userDrawn="0"/>
+      </p:nvGrpSpPr>
+      <p:grpSpPr bwMode="auto">
+        <a:xfrm>
+          <a:off x="0" y="0"/>
+          <a:ext cx="0" cy="0"/>
+          <a:chOff x="0" y="0"/>
+          <a:chExt cx="0" cy="0"/>
+        </a:xfrm>
+      </p:grpSpPr>
+      <p:sp>
+        <p:nvSpPr>
+          <p:cNvPr id="4" name="Google Shape;347;p64" hidden="0"/>
+          <p:cNvSpPr/>
+          <p:nvPr isPhoto="0" userDrawn="0"/>
+        </p:nvSpPr>
+        <p:spPr bwMode="auto">
+          <a:xfrm>
+            <a:off x="457200" y="2920659"/>
+            <a:ext cx="8228520" cy="618120"/>
+          </a:xfrm>
+          <a:prstGeom prst="rect">
+            <a:avLst/>
+          </a:prstGeom>
+          <a:noFill/>
+          <a:ln>
+            <a:noFill/>
+          </a:ln>
+        </p:spPr>
+        <p:txBody>
+          <a:bodyPr spcFirstLastPara="1" wrap="square" lIns="90000" tIns="45000" rIns="90000" bIns="45000" anchor="t" anchorCtr="0">
+            <a:noAutofit/>
+          </a:bodyPr>
+          <a:lstStyle/>
+          <a:p>
+            <a:pPr marL="0" marR="0" lvl="0" indent="0" algn="ctr">
+              <a:lnSpc>
+                <a:spcPct val="100000"/>
+              </a:lnSpc>
+              <a:spcBef>
+                <a:spcPts val="0"/>
+              </a:spcBef>
+              <a:spcAft>
+                <a:spcPts val="0"/>
+              </a:spcAft>
+              <a:buNone/>
+              <a:defRPr/>
+            </a:pPr>
+            <a:r>
+              <a:rPr lang="pt-BR" sz="3600" b="1" i="0" u="none" strike="noStrike" cap="none">
+                <a:solidFill>
+                  <a:srgbClr val="C00026"/>
+                </a:solidFill>
+                <a:latin typeface="Verdana"/>
+                <a:ea typeface="Verdana"/>
+                <a:cs typeface="Verdana"/>
+              </a:rPr>
+              <a:t>Atividade prática</a:t>
+            </a:r>
+            <a:endParaRPr sz="3600" b="1" i="0" u="none" strike="noStrike" cap="none">
+              <a:solidFill>
+                <a:schemeClr val="dk1"/>
+              </a:solidFill>
+              <a:latin typeface="Arial"/>
+              <a:ea typeface="Arial"/>
+              <a:cs typeface="Arial"/>
+            </a:endParaRPr>
+          </a:p>
+        </p:txBody>
+      </p:sp>
+      <p:sp>
+        <p:nvSpPr>
+          <p:cNvPr id="5" name="Google Shape;348;p64" hidden="0"/>
+          <p:cNvSpPr/>
+          <p:nvPr isPhoto="0" userDrawn="0"/>
+        </p:nvSpPr>
+        <p:spPr bwMode="auto">
+          <a:xfrm>
+            <a:off x="162000" y="85680"/>
+            <a:ext cx="7228440" cy="351360"/>
+          </a:xfrm>
+          <a:prstGeom prst="rect">
+            <a:avLst/>
+          </a:prstGeom>
+          <a:noFill/>
+          <a:ln>
+            <a:noFill/>
+          </a:ln>
+        </p:spPr>
+        <p:txBody>
+          <a:bodyPr spcFirstLastPara="1" wrap="square" lIns="91422" tIns="91422" rIns="91422" bIns="91422" anchor="ctr" anchorCtr="0">
+            <a:noAutofit/>
+          </a:bodyPr>
+          <a:lstStyle/>
+          <a:p>
+            <a:pPr marL="0" lvl="0" indent="0" algn="l">
+              <a:spcBef>
+                <a:spcPts val="0"/>
+              </a:spcBef>
+              <a:spcAft>
+                <a:spcPts val="0"/>
+              </a:spcAft>
+              <a:buNone/>
+              <a:defRPr/>
+            </a:pPr>
+            <a:endParaRPr/>
+          </a:p>
+        </p:txBody>
+      </p:sp>
+      <p:sp>
+        <p:nvSpPr>
+          <p:cNvPr id="6" name="Google Shape;349;p64" hidden="0"/>
+          <p:cNvSpPr/>
+          <p:nvPr isPhoto="0" userDrawn="0"/>
+        </p:nvSpPr>
+        <p:spPr bwMode="auto">
+          <a:xfrm>
+            <a:off x="84240" y="6402240"/>
+            <a:ext cx="640440" cy="363960"/>
+          </a:xfrm>
+          <a:prstGeom prst="rect">
+            <a:avLst/>
+          </a:prstGeom>
+          <a:noFill/>
+          <a:ln>
+            <a:noFill/>
+          </a:ln>
+        </p:spPr>
+        <p:txBody>
+          <a:bodyPr spcFirstLastPara="1" wrap="square" lIns="90000" tIns="45000" rIns="90000" bIns="45000" anchor="ctr" anchorCtr="0">
+            <a:noAutofit/>
+          </a:bodyPr>
+          <a:lstStyle/>
+          <a:p>
+            <a:pPr marL="0" marR="0" lvl="0" indent="0" algn="r">
+              <a:lnSpc>
+                <a:spcPct val="100000"/>
+              </a:lnSpc>
+              <a:spcBef>
+                <a:spcPts val="0"/>
+              </a:spcBef>
+              <a:spcAft>
+                <a:spcPts val="0"/>
+              </a:spcAft>
+              <a:buNone/>
+              <a:defRPr/>
+            </a:pPr>
+            <a:fld id="{3A137B1A-A4B7-34C6-6032-5F3D2FDB68F4}" type="slidenum">
+              <a:rPr lang="pt-BR" sz="1000" b="0" i="0" u="none" strike="noStrike" cap="none">
+                <a:solidFill>
+                  <a:srgbClr val="B2B2B2"/>
+                </a:solidFill>
+                <a:latin typeface="Verdana"/>
+                <a:ea typeface="Verdana"/>
+                <a:cs typeface="Verdana"/>
+              </a:rPr>
+              <a:t/>
+            </a:fld>
+            <a:endParaRPr sz="1000" b="0" i="0" u="none" strike="noStrike" cap="none">
+              <a:solidFill>
+                <a:schemeClr val="dk1"/>
+              </a:solidFill>
+              <a:latin typeface="Arial"/>
+              <a:ea typeface="Arial"/>
+              <a:cs typeface="Arial"/>
+            </a:endParaRPr>
+          </a:p>
+        </p:txBody>
+      </p:sp>
+      <p:sp>
+        <p:nvSpPr>
+          <p:cNvPr id="7" name="" hidden="0"/>
+          <p:cNvSpPr/>
+          <p:nvPr isPhoto="0" userDrawn="0"/>
+        </p:nvSpPr>
+        <p:spPr bwMode="auto">
+          <a:xfrm flipH="0" flipV="0">
+            <a:off x="724677" y="4088421"/>
+            <a:ext cx="8137933" cy="363449"/>
+          </a:xfrm>
+          <a:prstGeom prst="rect">
+            <a:avLst/>
+          </a:prstGeom>
+          <a:noFill/>
+        </p:spPr>
+        <p:txBody>
+          <a:bodyPr vertOverflow="overflow" horzOverflow="clip" vert="horz" wrap="square" lIns="91440" tIns="45720" rIns="91440" bIns="45720" numCol="1" spcCol="0" rtlCol="0" fromWordArt="0" anchor="t" anchorCtr="0" forceAA="0" upright="0" compatLnSpc="0">
+            <a:noAutofit/>
+          </a:bodyPr>
+          <a:p>
+            <a:pPr>
+              <a:defRPr/>
+            </a:pPr>
+            <a:r>
+              <a:rPr sz="2000" b="1"/>
+              <a:t>10 minutos para Parte 4 ....</a:t>
+            </a:r>
+            <a:endParaRPr sz="2000" b="1"/>
+          </a:p>
+          <a:p>
+            <a:pPr>
+              <a:defRPr/>
+            </a:pPr>
+            <a:endParaRPr sz="2000" b="0"/>
+          </a:p>
+        </p:txBody>
+      </p:sp>
+    </p:spTree>
+  </p:cSld>
+  <p:clrMapOvr>
+    <a:masterClrMapping/>
+  </p:clrMapOvr>
+  <mc:AlternateContent xmlns:mc="http://schemas.openxmlformats.org/markup-compatibility/2006">
+    <mc:Choice xmlns:p14="http://schemas.microsoft.com/office/powerpoint/2010/main" Requires="p14">
+      <p:transition p14:dur="2000" advClick="1"/>
+    </mc:Choice>
+    <mc:Fallback>
+      <p:transition advClick="1"/>
+    </mc:Fallback>
+  </mc:AlternateContent>
+</p:sld>
+</file>
+
+<file path=ppt/slides/slide14.xml><?xml version="1.0" encoding="utf-8"?>
 <p:sld xmlns:a="http://schemas.openxmlformats.org/drawingml/2006/main" xmlns:r="http://schemas.openxmlformats.org/officeDocument/2006/relationships" xmlns:p="http://schemas.openxmlformats.org/presentationml/2006/main" xmlns:m="http://schemas.openxmlformats.org/officeDocument/2006/math" xmlns:w="http://schemas.openxmlformats.org/wordprocessingml/2006/main" showMasterPhAnim="0" show="1">
   <p:cSld name="">
     <p:spTree>
@@ -14574,12 +14205,15 @@
               <a:defRPr/>
             </a:pPr>
             <a:r>
-              <a:rPr sz="2400" b="0" u="none">
+              <a:rPr lang="en-US" sz="2400" b="0" i="0" u="none" strike="noStrike" cap="none" spc="0">
                 <a:solidFill>
                   <a:schemeClr val="tx1"/>
                 </a:solidFill>
+                <a:latin typeface="Arial"/>
+                <a:ea typeface="Arial"/>
+                <a:cs typeface="Arial"/>
               </a:rPr>
-              <a:t>Depois de escolher um bom algoritmo e ter uma implementação ingênua, </a:t>
+              <a:t>Nossa otimização não funcionou, por que?</a:t>
             </a:r>
             <a:endParaRPr sz="2400" b="0" u="none">
               <a:solidFill>
@@ -14612,7 +14246,7 @@
                   <a:schemeClr val="tx1"/>
                 </a:solidFill>
               </a:rPr>
-              <a:t>Entrada/Saída custa caro. </a:t>
+              <a:t>Medir quanto tempo cada função demora?</a:t>
             </a:r>
             <a:endParaRPr sz="2400" b="0" u="none">
               <a:solidFill>
@@ -14621,7 +14255,22 @@
             </a:endParaRPr>
           </a:p>
           <a:p>
-            <a:pPr marL="394022" indent="-394022" algn="l">
+            <a:pPr marL="394021" indent="-394021" algn="l">
+              <a:lnSpc>
+                <a:spcPct val="150000"/>
+              </a:lnSpc>
+              <a:buFont typeface="Arial"/>
+              <a:buChar char="•"/>
+              <a:defRPr/>
+            </a:pPr>
+            <a:endParaRPr sz="2400" b="0" u="none">
+              <a:solidFill>
+                <a:schemeClr val="tx1"/>
+              </a:solidFill>
+            </a:endParaRPr>
+          </a:p>
+          <a:p>
+            <a:pPr marL="394021" indent="-394021" algn="l">
               <a:lnSpc>
                 <a:spcPct val="150000"/>
               </a:lnSpc>
@@ -14635,7 +14284,7 @@
                   <a:schemeClr val="tx1"/>
                 </a:solidFill>
               </a:rPr>
-              <a:t>Implementações diferentes do mesmo algoritmo podem ter desempenho diferente</a:t>
+              <a:t>Nossa função ficou mais rápida? Se sim, quanto? Se não, por que?</a:t>
             </a:r>
             <a:endParaRPr sz="2400" b="0" u="none">
               <a:solidFill>
@@ -14644,7 +14293,7 @@
             </a:endParaRPr>
           </a:p>
           <a:p>
-            <a:pPr marL="394022" indent="-394022" algn="l">
+            <a:pPr marL="394021" indent="-394021" algn="l">
               <a:lnSpc>
                 <a:spcPct val="150000"/>
               </a:lnSpc>
@@ -14652,14 +14301,49 @@
               <a:buChar char="•"/>
               <a:defRPr/>
             </a:pPr>
-            <a:r>
-              <a:rPr sz="2400" b="0" u="none">
-                <a:solidFill>
-                  <a:schemeClr val="tx1"/>
-                </a:solidFill>
-              </a:rPr>
-              <a:t>Medimos esses ganhos com ferramentas de profiling. </a:t>
-            </a:r>
+            <a:endParaRPr sz="2400" b="0" u="none">
+              <a:solidFill>
+                <a:schemeClr val="tx1"/>
+              </a:solidFill>
+            </a:endParaRPr>
+          </a:p>
+          <a:p>
+            <a:pPr algn="l">
+              <a:lnSpc>
+                <a:spcPct val="150000"/>
+              </a:lnSpc>
+              <a:defRPr/>
+            </a:pPr>
+            <a:endParaRPr sz="2400" b="0" u="none">
+              <a:solidFill>
+                <a:schemeClr val="tx1"/>
+              </a:solidFill>
+            </a:endParaRPr>
+          </a:p>
+          <a:p>
+            <a:pPr marL="394021" indent="-394021" algn="l">
+              <a:lnSpc>
+                <a:spcPct val="150000"/>
+              </a:lnSpc>
+              <a:buFont typeface="Arial"/>
+              <a:buChar char="•"/>
+              <a:defRPr/>
+            </a:pPr>
+            <a:endParaRPr sz="2400" b="0" u="none">
+              <a:solidFill>
+                <a:schemeClr val="tx1"/>
+              </a:solidFill>
+            </a:endParaRPr>
+          </a:p>
+          <a:p>
+            <a:pPr marL="394021" indent="-394021" algn="l">
+              <a:lnSpc>
+                <a:spcPct val="150000"/>
+              </a:lnSpc>
+              <a:buFont typeface="Arial"/>
+              <a:buChar char="•"/>
+              <a:defRPr/>
+            </a:pPr>
             <a:endParaRPr sz="2400" b="0" u="none">
               <a:solidFill>
                 <a:schemeClr val="tx1"/>
@@ -14696,7 +14380,7 @@
 </p:sld>
 </file>
 
-<file path=ppt/slides/slide16.xml><?xml version="1.0" encoding="utf-8"?>
+<file path=ppt/slides/slide15.xml><?xml version="1.0" encoding="utf-8"?>
 <p:sld xmlns:a="http://schemas.openxmlformats.org/drawingml/2006/main" xmlns:r="http://schemas.openxmlformats.org/officeDocument/2006/relationships" xmlns:p="http://schemas.openxmlformats.org/presentationml/2006/main" xmlns:m="http://schemas.openxmlformats.org/officeDocument/2006/math" xmlns:w="http://schemas.openxmlformats.org/wordprocessingml/2006/main" showMasterPhAnim="0" show="1">
   <p:cSld name="">
     <p:bg>
@@ -15098,45 +14782,6 @@
                 <a:cs typeface="Arial"/>
               </a:rPr>
               <a:t>Implementação vs algoritmo</a:t>
-            </a:r>
-            <a:endParaRPr sz="3200" b="0" i="0" u="none" strike="noStrike" cap="none">
-              <a:solidFill>
-                <a:schemeClr val="dk1"/>
-              </a:solidFill>
-              <a:latin typeface="Arial"/>
-              <a:ea typeface="Arial"/>
-              <a:cs typeface="Arial"/>
-            </a:endParaRPr>
-          </a:p>
-          <a:p>
-            <a:pPr marL="216000" marR="0" lvl="0" indent="-216000" algn="l">
-              <a:lnSpc>
-                <a:spcPct val="100000"/>
-              </a:lnSpc>
-              <a:spcBef>
-                <a:spcPts val="3967"/>
-              </a:spcBef>
-              <a:spcAft>
-                <a:spcPts val="0"/>
-              </a:spcAft>
-              <a:buClr>
-                <a:srgbClr val="000000"/>
-              </a:buClr>
-              <a:buSzPts val="1440"/>
-              <a:buFont typeface="Noto Sans Symbols"/>
-              <a:buChar char="●"/>
-              <a:defRPr/>
-            </a:pPr>
-            <a:r>
-              <a:rPr lang="pt-BR" sz="3200" b="0" i="0" u="none" strike="noStrike" cap="none">
-                <a:solidFill>
-                  <a:schemeClr val="dk1"/>
-                </a:solidFill>
-                <a:latin typeface="Arial"/>
-                <a:ea typeface="Arial"/>
-                <a:cs typeface="Arial"/>
-              </a:rPr>
-              <a:t>Medição de desempenho</a:t>
             </a:r>
             <a:endParaRPr sz="3200" b="0" i="0" u="none" strike="noStrike" cap="none">
               <a:solidFill>

</xml_diff>